<commit_message>
add CTR predict PDF and rewrite workshop_summary.pptx document
</commit_message>
<xml_diff>
--- a/workshop_summary.pptx
+++ b/workshop_summary.pptx
@@ -5,7 +5,7 @@
     <p:sldMasterId id="2147483648" r:id="rId1"/>
   </p:sldMasterIdLst>
   <p:notesMasterIdLst>
-    <p:notesMasterId r:id="rId9"/>
+    <p:notesMasterId r:id="rId14"/>
   </p:notesMasterIdLst>
   <p:sldIdLst>
     <p:sldId id="256" r:id="rId2"/>
@@ -15,6 +15,11 @@
     <p:sldId id="260" r:id="rId6"/>
     <p:sldId id="262" r:id="rId7"/>
     <p:sldId id="261" r:id="rId8"/>
+    <p:sldId id="263" r:id="rId9"/>
+    <p:sldId id="266" r:id="rId10"/>
+    <p:sldId id="264" r:id="rId11"/>
+    <p:sldId id="265" r:id="rId12"/>
+    <p:sldId id="267" r:id="rId13"/>
   </p:sldIdLst>
   <p:sldSz cx="12192000" cy="6858000"/>
   <p:notesSz cx="6858000" cy="9144000"/>
@@ -113,6 +118,11 @@
       </a:defRPr>
     </a:lvl9pPr>
   </p:defaultTextStyle>
+  <p:extLst>
+    <p:ext uri="{EFAFB233-063F-42B5-8137-9DF3F51BA10A}">
+      <p15:sldGuideLst xmlns:p15="http://schemas.microsoft.com/office/powerpoint/2012/main"/>
+    </p:ext>
+  </p:extLst>
 </p:presentation>
 </file>
 
@@ -198,7 +208,7 @@
           <a:p>
             <a:fld id="{7E45A342-5B8C-47A5-A361-1075BECA0050}" type="datetimeFigureOut">
               <a:rPr lang="zh-CN" altLang="en-US" smtClean="0"/>
-              <a:t>2020/11/27</a:t>
+              <a:t>2020/12/4</a:t>
             </a:fld>
             <a:endParaRPr lang="zh-CN" altLang="en-US"/>
           </a:p>
@@ -3786,6 +3796,798 @@
 </p:sld>
 </file>
 
+<file path=ppt/slides/slide10.xml><?xml version="1.0" encoding="utf-8"?>
+<p:sld xmlns:a="http://schemas.openxmlformats.org/drawingml/2006/main" xmlns:r="http://schemas.openxmlformats.org/officeDocument/2006/relationships" xmlns:p="http://schemas.openxmlformats.org/presentationml/2006/main">
+  <p:cSld>
+    <p:spTree>
+      <p:nvGrpSpPr>
+        <p:cNvPr id="1" name=""/>
+        <p:cNvGrpSpPr/>
+        <p:nvPr/>
+      </p:nvGrpSpPr>
+      <p:grpSpPr>
+        <a:xfrm>
+          <a:off x="0" y="0"/>
+          <a:ext cx="0" cy="0"/>
+          <a:chOff x="0" y="0"/>
+          <a:chExt cx="0" cy="0"/>
+        </a:xfrm>
+      </p:grpSpPr>
+      <p:sp>
+        <p:nvSpPr>
+          <p:cNvPr id="2" name="标题 1">
+            <a:extLst>
+              <a:ext uri="{FF2B5EF4-FFF2-40B4-BE49-F238E27FC236}">
+                <a16:creationId xmlns:a16="http://schemas.microsoft.com/office/drawing/2014/main" id="{B53D1DB0-4948-4C40-ABE2-24748E08D89E}"/>
+              </a:ext>
+            </a:extLst>
+          </p:cNvPr>
+          <p:cNvSpPr>
+            <a:spLocks noGrp="1"/>
+          </p:cNvSpPr>
+          <p:nvPr>
+            <p:ph type="title"/>
+          </p:nvPr>
+        </p:nvSpPr>
+        <p:spPr/>
+        <p:txBody>
+          <a:bodyPr/>
+          <a:lstStyle/>
+          <a:p>
+            <a:r>
+              <a:rPr lang="zh-CN" altLang="en-US" dirty="0"/>
+              <a:t>第九次讨论会</a:t>
+            </a:r>
+          </a:p>
+        </p:txBody>
+      </p:sp>
+      <p:sp>
+        <p:nvSpPr>
+          <p:cNvPr id="4" name="日期占位符 3">
+            <a:extLst>
+              <a:ext uri="{FF2B5EF4-FFF2-40B4-BE49-F238E27FC236}">
+                <a16:creationId xmlns:a16="http://schemas.microsoft.com/office/drawing/2014/main" id="{2C193441-EA8D-454F-90AA-B5CD869E709B}"/>
+              </a:ext>
+            </a:extLst>
+          </p:cNvPr>
+          <p:cNvSpPr>
+            <a:spLocks noGrp="1"/>
+          </p:cNvSpPr>
+          <p:nvPr>
+            <p:ph type="dt" sz="half" idx="10"/>
+          </p:nvPr>
+        </p:nvSpPr>
+        <p:spPr/>
+        <p:txBody>
+          <a:bodyPr/>
+          <a:lstStyle/>
+          <a:p>
+            <a:r>
+              <a:rPr lang="en-US" altLang="zh-CN" dirty="0"/>
+              <a:t>2020/12/3</a:t>
+            </a:r>
+            <a:endParaRPr lang="zh-CN" altLang="en-US" dirty="0"/>
+          </a:p>
+        </p:txBody>
+      </p:sp>
+      <p:pic>
+        <p:nvPicPr>
+          <p:cNvPr id="6" name="Picture 2">
+            <a:extLst>
+              <a:ext uri="{FF2B5EF4-FFF2-40B4-BE49-F238E27FC236}">
+                <a16:creationId xmlns:a16="http://schemas.microsoft.com/office/drawing/2014/main" id="{43ED0451-2FEF-49D5-A015-CE2DD874C771}"/>
+              </a:ext>
+            </a:extLst>
+          </p:cNvPr>
+          <p:cNvPicPr>
+            <a:picLocks noGrp="1" noChangeAspect="1" noChangeArrowheads="1"/>
+          </p:cNvPicPr>
+          <p:nvPr>
+            <p:ph idx="1"/>
+          </p:nvPr>
+        </p:nvPicPr>
+        <p:blipFill>
+          <a:blip r:embed="rId2">
+            <a:extLst>
+              <a:ext uri="{28A0092B-C50C-407E-A947-70E740481C1C}">
+                <a14:useLocalDpi xmlns:a14="http://schemas.microsoft.com/office/drawing/2010/main" val="0"/>
+              </a:ext>
+            </a:extLst>
+          </a:blip>
+          <a:srcRect/>
+          <a:stretch>
+            <a:fillRect/>
+          </a:stretch>
+        </p:blipFill>
+        <p:spPr bwMode="auto">
+          <a:xfrm>
+            <a:off x="1130945" y="2081322"/>
+            <a:ext cx="4607186" cy="3154351"/>
+          </a:xfrm>
+          <a:prstGeom prst="rect">
+            <a:avLst/>
+          </a:prstGeom>
+          <a:noFill/>
+          <a:extLst>
+            <a:ext uri="{909E8E84-426E-40DD-AFC4-6F175D3DCCD1}">
+              <a14:hiddenFill xmlns:a14="http://schemas.microsoft.com/office/drawing/2010/main">
+                <a:solidFill>
+                  <a:srgbClr val="FFFFFF"/>
+                </a:solidFill>
+              </a14:hiddenFill>
+            </a:ext>
+          </a:extLst>
+        </p:spPr>
+      </p:pic>
+      <p:pic>
+        <p:nvPicPr>
+          <p:cNvPr id="1026" name="Picture 2">
+            <a:extLst>
+              <a:ext uri="{FF2B5EF4-FFF2-40B4-BE49-F238E27FC236}">
+                <a16:creationId xmlns:a16="http://schemas.microsoft.com/office/drawing/2014/main" id="{8660E587-5054-4530-B8F0-4B0182F5D27E}"/>
+              </a:ext>
+            </a:extLst>
+          </p:cNvPr>
+          <p:cNvPicPr>
+            <a:picLocks noChangeAspect="1" noChangeArrowheads="1"/>
+          </p:cNvPicPr>
+          <p:nvPr/>
+        </p:nvPicPr>
+        <p:blipFill>
+          <a:blip r:embed="rId3">
+            <a:extLst>
+              <a:ext uri="{28A0092B-C50C-407E-A947-70E740481C1C}">
+                <a14:useLocalDpi xmlns:a14="http://schemas.microsoft.com/office/drawing/2010/main" val="0"/>
+              </a:ext>
+            </a:extLst>
+          </a:blip>
+          <a:srcRect/>
+          <a:stretch>
+            <a:fillRect/>
+          </a:stretch>
+        </p:blipFill>
+        <p:spPr bwMode="auto">
+          <a:xfrm>
+            <a:off x="5844663" y="2081322"/>
+            <a:ext cx="4876799" cy="3338945"/>
+          </a:xfrm>
+          <a:prstGeom prst="rect">
+            <a:avLst/>
+          </a:prstGeom>
+          <a:noFill/>
+          <a:extLst>
+            <a:ext uri="{909E8E84-426E-40DD-AFC4-6F175D3DCCD1}">
+              <a14:hiddenFill xmlns:a14="http://schemas.microsoft.com/office/drawing/2010/main">
+                <a:solidFill>
+                  <a:srgbClr val="FFFFFF"/>
+                </a:solidFill>
+              </a14:hiddenFill>
+            </a:ext>
+          </a:extLst>
+        </p:spPr>
+      </p:pic>
+      <p:sp>
+        <p:nvSpPr>
+          <p:cNvPr id="7" name="文本框 6">
+            <a:extLst>
+              <a:ext uri="{FF2B5EF4-FFF2-40B4-BE49-F238E27FC236}">
+                <a16:creationId xmlns:a16="http://schemas.microsoft.com/office/drawing/2014/main" id="{BD1DF264-B626-4381-8CDD-C74CB5312321}"/>
+              </a:ext>
+            </a:extLst>
+          </p:cNvPr>
+          <p:cNvSpPr txBox="1"/>
+          <p:nvPr/>
+        </p:nvSpPr>
+        <p:spPr>
+          <a:xfrm>
+            <a:off x="2188043" y="5131293"/>
+            <a:ext cx="2492990" cy="369332"/>
+          </a:xfrm>
+          <a:prstGeom prst="rect">
+            <a:avLst/>
+          </a:prstGeom>
+          <a:noFill/>
+        </p:spPr>
+        <p:txBody>
+          <a:bodyPr wrap="none" rtlCol="0">
+            <a:spAutoFit/>
+          </a:bodyPr>
+          <a:lstStyle/>
+          <a:p>
+            <a:r>
+              <a:rPr lang="zh-CN" altLang="en-US" dirty="0"/>
+              <a:t>不加降水量做为输入的</a:t>
+            </a:r>
+          </a:p>
+        </p:txBody>
+      </p:sp>
+      <p:sp>
+        <p:nvSpPr>
+          <p:cNvPr id="8" name="矩形 7">
+            <a:extLst>
+              <a:ext uri="{FF2B5EF4-FFF2-40B4-BE49-F238E27FC236}">
+                <a16:creationId xmlns:a16="http://schemas.microsoft.com/office/drawing/2014/main" id="{D43FF37A-E210-42CF-85D8-D919D9098B77}"/>
+              </a:ext>
+            </a:extLst>
+          </p:cNvPr>
+          <p:cNvSpPr/>
+          <p:nvPr/>
+        </p:nvSpPr>
+        <p:spPr>
+          <a:xfrm>
+            <a:off x="6791488" y="5131293"/>
+            <a:ext cx="2262158" cy="369332"/>
+          </a:xfrm>
+          <a:prstGeom prst="rect">
+            <a:avLst/>
+          </a:prstGeom>
+        </p:spPr>
+        <p:txBody>
+          <a:bodyPr wrap="none">
+            <a:spAutoFit/>
+          </a:bodyPr>
+          <a:lstStyle/>
+          <a:p>
+            <a:r>
+              <a:rPr lang="zh-CN" altLang="en-US" dirty="0"/>
+              <a:t>加降水量做为输入的</a:t>
+            </a:r>
+          </a:p>
+        </p:txBody>
+      </p:sp>
+      <p:sp>
+        <p:nvSpPr>
+          <p:cNvPr id="9" name="文本框 8">
+            <a:extLst>
+              <a:ext uri="{FF2B5EF4-FFF2-40B4-BE49-F238E27FC236}">
+                <a16:creationId xmlns:a16="http://schemas.microsoft.com/office/drawing/2014/main" id="{3CC440FF-DFD1-4915-AF58-FDC71C74AF21}"/>
+              </a:ext>
+            </a:extLst>
+          </p:cNvPr>
+          <p:cNvSpPr txBox="1"/>
+          <p:nvPr/>
+        </p:nvSpPr>
+        <p:spPr>
+          <a:xfrm>
+            <a:off x="4148597" y="1635509"/>
+            <a:ext cx="4134465" cy="523220"/>
+          </a:xfrm>
+          <a:prstGeom prst="rect">
+            <a:avLst/>
+          </a:prstGeom>
+          <a:noFill/>
+        </p:spPr>
+        <p:txBody>
+          <a:bodyPr wrap="none" rtlCol="0">
+            <a:spAutoFit/>
+          </a:bodyPr>
+          <a:lstStyle/>
+          <a:p>
+            <a:r>
+              <a:rPr lang="zh-CN" altLang="en-US" sz="2800" dirty="0"/>
+              <a:t>归一化，绘制的图像结果</a:t>
+            </a:r>
+          </a:p>
+        </p:txBody>
+      </p:sp>
+    </p:spTree>
+    <p:extLst>
+      <p:ext uri="{BB962C8B-B14F-4D97-AF65-F5344CB8AC3E}">
+        <p14:creationId xmlns:p14="http://schemas.microsoft.com/office/powerpoint/2010/main" val="740514639"/>
+      </p:ext>
+    </p:extLst>
+  </p:cSld>
+  <p:clrMapOvr>
+    <a:masterClrMapping/>
+  </p:clrMapOvr>
+</p:sld>
+</file>
+
+<file path=ppt/slides/slide11.xml><?xml version="1.0" encoding="utf-8"?>
+<p:sld xmlns:a="http://schemas.openxmlformats.org/drawingml/2006/main" xmlns:r="http://schemas.openxmlformats.org/officeDocument/2006/relationships" xmlns:p="http://schemas.openxmlformats.org/presentationml/2006/main">
+  <p:cSld>
+    <p:spTree>
+      <p:nvGrpSpPr>
+        <p:cNvPr id="1" name=""/>
+        <p:cNvGrpSpPr/>
+        <p:nvPr/>
+      </p:nvGrpSpPr>
+      <p:grpSpPr>
+        <a:xfrm>
+          <a:off x="0" y="0"/>
+          <a:ext cx="0" cy="0"/>
+          <a:chOff x="0" y="0"/>
+          <a:chExt cx="0" cy="0"/>
+        </a:xfrm>
+      </p:grpSpPr>
+      <p:sp>
+        <p:nvSpPr>
+          <p:cNvPr id="2" name="标题 1">
+            <a:extLst>
+              <a:ext uri="{FF2B5EF4-FFF2-40B4-BE49-F238E27FC236}">
+                <a16:creationId xmlns:a16="http://schemas.microsoft.com/office/drawing/2014/main" id="{BFE0C7B4-D9F1-46ED-9D38-478C11B51FE6}"/>
+              </a:ext>
+            </a:extLst>
+          </p:cNvPr>
+          <p:cNvSpPr>
+            <a:spLocks noGrp="1"/>
+          </p:cNvSpPr>
+          <p:nvPr>
+            <p:ph type="title"/>
+          </p:nvPr>
+        </p:nvSpPr>
+        <p:spPr/>
+        <p:txBody>
+          <a:bodyPr/>
+          <a:lstStyle/>
+          <a:p>
+            <a:r>
+              <a:rPr lang="zh-CN" altLang="en-US" dirty="0"/>
+              <a:t>第九次讨论会</a:t>
+            </a:r>
+          </a:p>
+        </p:txBody>
+      </p:sp>
+      <p:sp>
+        <p:nvSpPr>
+          <p:cNvPr id="4" name="日期占位符 3">
+            <a:extLst>
+              <a:ext uri="{FF2B5EF4-FFF2-40B4-BE49-F238E27FC236}">
+                <a16:creationId xmlns:a16="http://schemas.microsoft.com/office/drawing/2014/main" id="{DC47B70B-3CCF-42F1-B8B7-104343814242}"/>
+              </a:ext>
+            </a:extLst>
+          </p:cNvPr>
+          <p:cNvSpPr>
+            <a:spLocks noGrp="1"/>
+          </p:cNvSpPr>
+          <p:nvPr>
+            <p:ph type="dt" sz="half" idx="10"/>
+          </p:nvPr>
+        </p:nvSpPr>
+        <p:spPr/>
+        <p:txBody>
+          <a:bodyPr/>
+          <a:lstStyle/>
+          <a:p>
+            <a:r>
+              <a:rPr lang="en-US" altLang="zh-CN" dirty="0"/>
+              <a:t>2020/12/3</a:t>
+            </a:r>
+            <a:endParaRPr lang="zh-CN" altLang="en-US" dirty="0"/>
+          </a:p>
+        </p:txBody>
+      </p:sp>
+      <p:pic>
+        <p:nvPicPr>
+          <p:cNvPr id="2050" name="Picture 2">
+            <a:extLst>
+              <a:ext uri="{FF2B5EF4-FFF2-40B4-BE49-F238E27FC236}">
+                <a16:creationId xmlns:a16="http://schemas.microsoft.com/office/drawing/2014/main" id="{D8F821E0-EF82-4DE9-8351-D6E551A0E9DB}"/>
+              </a:ext>
+            </a:extLst>
+          </p:cNvPr>
+          <p:cNvPicPr>
+            <a:picLocks noGrp="1" noChangeAspect="1" noChangeArrowheads="1"/>
+          </p:cNvPicPr>
+          <p:nvPr>
+            <p:ph idx="1"/>
+          </p:nvPr>
+        </p:nvPicPr>
+        <p:blipFill>
+          <a:blip r:embed="rId2">
+            <a:extLst>
+              <a:ext uri="{28A0092B-C50C-407E-A947-70E740481C1C}">
+                <a14:useLocalDpi xmlns:a14="http://schemas.microsoft.com/office/drawing/2010/main" val="0"/>
+              </a:ext>
+            </a:extLst>
+          </a:blip>
+          <a:srcRect/>
+          <a:stretch>
+            <a:fillRect/>
+          </a:stretch>
+        </p:blipFill>
+        <p:spPr bwMode="auto">
+          <a:xfrm>
+            <a:off x="997998" y="2388412"/>
+            <a:ext cx="4471419" cy="3061397"/>
+          </a:xfrm>
+          <a:prstGeom prst="rect">
+            <a:avLst/>
+          </a:prstGeom>
+          <a:noFill/>
+          <a:extLst>
+            <a:ext uri="{909E8E84-426E-40DD-AFC4-6F175D3DCCD1}">
+              <a14:hiddenFill xmlns:a14="http://schemas.microsoft.com/office/drawing/2010/main">
+                <a:solidFill>
+                  <a:srgbClr val="FFFFFF"/>
+                </a:solidFill>
+              </a14:hiddenFill>
+            </a:ext>
+          </a:extLst>
+        </p:spPr>
+      </p:pic>
+      <p:pic>
+        <p:nvPicPr>
+          <p:cNvPr id="2052" name="Picture 4">
+            <a:extLst>
+              <a:ext uri="{FF2B5EF4-FFF2-40B4-BE49-F238E27FC236}">
+                <a16:creationId xmlns:a16="http://schemas.microsoft.com/office/drawing/2014/main" id="{4794BC68-94AD-4455-A477-B3EE5C71D185}"/>
+              </a:ext>
+            </a:extLst>
+          </p:cNvPr>
+          <p:cNvPicPr>
+            <a:picLocks noChangeAspect="1" noChangeArrowheads="1"/>
+          </p:cNvPicPr>
+          <p:nvPr/>
+        </p:nvPicPr>
+        <p:blipFill>
+          <a:blip r:embed="rId3">
+            <a:extLst>
+              <a:ext uri="{28A0092B-C50C-407E-A947-70E740481C1C}">
+                <a14:useLocalDpi xmlns:a14="http://schemas.microsoft.com/office/drawing/2010/main" val="0"/>
+              </a:ext>
+            </a:extLst>
+          </a:blip>
+          <a:srcRect/>
+          <a:stretch>
+            <a:fillRect/>
+          </a:stretch>
+        </p:blipFill>
+        <p:spPr bwMode="auto">
+          <a:xfrm>
+            <a:off x="6245748" y="2388412"/>
+            <a:ext cx="4471418" cy="3061397"/>
+          </a:xfrm>
+          <a:prstGeom prst="rect">
+            <a:avLst/>
+          </a:prstGeom>
+          <a:noFill/>
+          <a:extLst>
+            <a:ext uri="{909E8E84-426E-40DD-AFC4-6F175D3DCCD1}">
+              <a14:hiddenFill xmlns:a14="http://schemas.microsoft.com/office/drawing/2010/main">
+                <a:solidFill>
+                  <a:srgbClr val="FFFFFF"/>
+                </a:solidFill>
+              </a14:hiddenFill>
+            </a:ext>
+          </a:extLst>
+        </p:spPr>
+      </p:pic>
+      <p:sp>
+        <p:nvSpPr>
+          <p:cNvPr id="8" name="文本框 7">
+            <a:extLst>
+              <a:ext uri="{FF2B5EF4-FFF2-40B4-BE49-F238E27FC236}">
+                <a16:creationId xmlns:a16="http://schemas.microsoft.com/office/drawing/2014/main" id="{76C1ECE4-D60F-48A8-AE9E-90EE68F6403A}"/>
+              </a:ext>
+            </a:extLst>
+          </p:cNvPr>
+          <p:cNvSpPr txBox="1"/>
+          <p:nvPr/>
+        </p:nvSpPr>
+        <p:spPr>
+          <a:xfrm>
+            <a:off x="1987212" y="5265143"/>
+            <a:ext cx="2492990" cy="369332"/>
+          </a:xfrm>
+          <a:prstGeom prst="rect">
+            <a:avLst/>
+          </a:prstGeom>
+          <a:noFill/>
+        </p:spPr>
+        <p:txBody>
+          <a:bodyPr wrap="none" rtlCol="0">
+            <a:spAutoFit/>
+          </a:bodyPr>
+          <a:lstStyle/>
+          <a:p>
+            <a:r>
+              <a:rPr lang="zh-CN" altLang="en-US" dirty="0"/>
+              <a:t>不加降水量做为输入的</a:t>
+            </a:r>
+          </a:p>
+        </p:txBody>
+      </p:sp>
+      <p:sp>
+        <p:nvSpPr>
+          <p:cNvPr id="9" name="矩形 8">
+            <a:extLst>
+              <a:ext uri="{FF2B5EF4-FFF2-40B4-BE49-F238E27FC236}">
+                <a16:creationId xmlns:a16="http://schemas.microsoft.com/office/drawing/2014/main" id="{EA387CF9-D8AE-4FD9-9BD0-D10EAFF87222}"/>
+              </a:ext>
+            </a:extLst>
+          </p:cNvPr>
+          <p:cNvSpPr/>
+          <p:nvPr/>
+        </p:nvSpPr>
+        <p:spPr>
+          <a:xfrm>
+            <a:off x="7022321" y="5265143"/>
+            <a:ext cx="2262158" cy="369332"/>
+          </a:xfrm>
+          <a:prstGeom prst="rect">
+            <a:avLst/>
+          </a:prstGeom>
+        </p:spPr>
+        <p:txBody>
+          <a:bodyPr wrap="none">
+            <a:spAutoFit/>
+          </a:bodyPr>
+          <a:lstStyle/>
+          <a:p>
+            <a:r>
+              <a:rPr lang="zh-CN" altLang="en-US" dirty="0"/>
+              <a:t>加降水量做为输入的</a:t>
+            </a:r>
+          </a:p>
+        </p:txBody>
+      </p:sp>
+      <p:sp>
+        <p:nvSpPr>
+          <p:cNvPr id="6" name="文本框 5">
+            <a:extLst>
+              <a:ext uri="{FF2B5EF4-FFF2-40B4-BE49-F238E27FC236}">
+                <a16:creationId xmlns:a16="http://schemas.microsoft.com/office/drawing/2014/main" id="{58BBDA51-1155-479E-AB2B-5820C20758C9}"/>
+              </a:ext>
+            </a:extLst>
+          </p:cNvPr>
+          <p:cNvSpPr txBox="1"/>
+          <p:nvPr/>
+        </p:nvSpPr>
+        <p:spPr>
+          <a:xfrm>
+            <a:off x="4387840" y="1704976"/>
+            <a:ext cx="3416320" cy="523220"/>
+          </a:xfrm>
+          <a:prstGeom prst="rect">
+            <a:avLst/>
+          </a:prstGeom>
+          <a:noFill/>
+        </p:spPr>
+        <p:txBody>
+          <a:bodyPr wrap="none" rtlCol="0">
+            <a:spAutoFit/>
+          </a:bodyPr>
+          <a:lstStyle/>
+          <a:p>
+            <a:r>
+              <a:rPr lang="zh-CN" altLang="en-US" sz="2800" dirty="0"/>
+              <a:t>原数据绘制图像结果</a:t>
+            </a:r>
+          </a:p>
+        </p:txBody>
+      </p:sp>
+    </p:spTree>
+    <p:extLst>
+      <p:ext uri="{BB962C8B-B14F-4D97-AF65-F5344CB8AC3E}">
+        <p14:creationId xmlns:p14="http://schemas.microsoft.com/office/powerpoint/2010/main" val="432931852"/>
+      </p:ext>
+    </p:extLst>
+  </p:cSld>
+  <p:clrMapOvr>
+    <a:masterClrMapping/>
+  </p:clrMapOvr>
+</p:sld>
+</file>
+
+<file path=ppt/slides/slide12.xml><?xml version="1.0" encoding="utf-8"?>
+<p:sld xmlns:a="http://schemas.openxmlformats.org/drawingml/2006/main" xmlns:r="http://schemas.openxmlformats.org/officeDocument/2006/relationships" xmlns:p="http://schemas.openxmlformats.org/presentationml/2006/main">
+  <p:cSld>
+    <p:spTree>
+      <p:nvGrpSpPr>
+        <p:cNvPr id="1" name=""/>
+        <p:cNvGrpSpPr/>
+        <p:nvPr/>
+      </p:nvGrpSpPr>
+      <p:grpSpPr>
+        <a:xfrm>
+          <a:off x="0" y="0"/>
+          <a:ext cx="0" cy="0"/>
+          <a:chOff x="0" y="0"/>
+          <a:chExt cx="0" cy="0"/>
+        </a:xfrm>
+      </p:grpSpPr>
+      <p:sp>
+        <p:nvSpPr>
+          <p:cNvPr id="2" name="标题 1">
+            <a:extLst>
+              <a:ext uri="{FF2B5EF4-FFF2-40B4-BE49-F238E27FC236}">
+                <a16:creationId xmlns:a16="http://schemas.microsoft.com/office/drawing/2014/main" id="{BFE0C7B4-D9F1-46ED-9D38-478C11B51FE6}"/>
+              </a:ext>
+            </a:extLst>
+          </p:cNvPr>
+          <p:cNvSpPr>
+            <a:spLocks noGrp="1"/>
+          </p:cNvSpPr>
+          <p:nvPr>
+            <p:ph type="title"/>
+          </p:nvPr>
+        </p:nvSpPr>
+        <p:spPr/>
+        <p:txBody>
+          <a:bodyPr/>
+          <a:lstStyle/>
+          <a:p>
+            <a:r>
+              <a:rPr lang="zh-CN" altLang="en-US" dirty="0"/>
+              <a:t>第九次讨论会</a:t>
+            </a:r>
+          </a:p>
+        </p:txBody>
+      </p:sp>
+      <p:sp>
+        <p:nvSpPr>
+          <p:cNvPr id="4" name="日期占位符 3">
+            <a:extLst>
+              <a:ext uri="{FF2B5EF4-FFF2-40B4-BE49-F238E27FC236}">
+                <a16:creationId xmlns:a16="http://schemas.microsoft.com/office/drawing/2014/main" id="{DC47B70B-3CCF-42F1-B8B7-104343814242}"/>
+              </a:ext>
+            </a:extLst>
+          </p:cNvPr>
+          <p:cNvSpPr>
+            <a:spLocks noGrp="1"/>
+          </p:cNvSpPr>
+          <p:nvPr>
+            <p:ph type="dt" sz="half" idx="10"/>
+          </p:nvPr>
+        </p:nvSpPr>
+        <p:spPr/>
+        <p:txBody>
+          <a:bodyPr/>
+          <a:lstStyle/>
+          <a:p>
+            <a:r>
+              <a:rPr lang="en-US" altLang="zh-CN" dirty="0"/>
+              <a:t>2020/12/3</a:t>
+            </a:r>
+            <a:endParaRPr lang="zh-CN" altLang="en-US" dirty="0"/>
+          </a:p>
+        </p:txBody>
+      </p:sp>
+      <p:sp>
+        <p:nvSpPr>
+          <p:cNvPr id="7" name="内容占位符 6">
+            <a:extLst>
+              <a:ext uri="{FF2B5EF4-FFF2-40B4-BE49-F238E27FC236}">
+                <a16:creationId xmlns:a16="http://schemas.microsoft.com/office/drawing/2014/main" id="{D6AEB015-4C8B-4D7F-9DEF-A52C94C72EBE}"/>
+              </a:ext>
+            </a:extLst>
+          </p:cNvPr>
+          <p:cNvSpPr>
+            <a:spLocks noGrp="1"/>
+          </p:cNvSpPr>
+          <p:nvPr>
+            <p:ph idx="1"/>
+          </p:nvPr>
+        </p:nvSpPr>
+        <p:spPr>
+          <a:xfrm>
+            <a:off x="838200" y="1700860"/>
+            <a:ext cx="10515600" cy="4351338"/>
+          </a:xfrm>
+        </p:spPr>
+        <p:txBody>
+          <a:bodyPr/>
+          <a:lstStyle/>
+          <a:p>
+            <a:r>
+              <a:rPr lang="zh-CN" altLang="en-US" dirty="0"/>
+              <a:t>实验分析：</a:t>
+            </a:r>
+            <a:endParaRPr lang="en-US" altLang="zh-CN" dirty="0"/>
+          </a:p>
+          <a:p>
+            <a:pPr marL="0" indent="0">
+              <a:buNone/>
+            </a:pPr>
+            <a:r>
+              <a:rPr lang="zh-CN" altLang="en-US" sz="2400" dirty="0"/>
+              <a:t>实验最后的效果不是很好，预测的超过</a:t>
+            </a:r>
+            <a:r>
+              <a:rPr lang="en-US" altLang="zh-CN" sz="2400" dirty="0"/>
+              <a:t>0.6</a:t>
+            </a:r>
+            <a:r>
+              <a:rPr lang="zh-CN" altLang="en-US" sz="2400" dirty="0"/>
+              <a:t>的，上升了</a:t>
+            </a:r>
+            <a:r>
+              <a:rPr lang="en-US" altLang="zh-CN" sz="2400" dirty="0"/>
+              <a:t>2</a:t>
+            </a:r>
+            <a:r>
+              <a:rPr lang="zh-CN" altLang="en-US" sz="2400" dirty="0"/>
+              <a:t>个，但是预测的超过</a:t>
+            </a:r>
+            <a:r>
+              <a:rPr lang="en-US" altLang="zh-CN" sz="2400" dirty="0"/>
+              <a:t>0.5</a:t>
+            </a:r>
+            <a:r>
+              <a:rPr lang="zh-CN" altLang="en-US" sz="2400" dirty="0"/>
+              <a:t>的，减少了</a:t>
+            </a:r>
+            <a:r>
+              <a:rPr lang="en-US" altLang="zh-CN" sz="2400" dirty="0"/>
+              <a:t>5</a:t>
+            </a:r>
+            <a:r>
+              <a:rPr lang="zh-CN" altLang="en-US" sz="2400" dirty="0"/>
+              <a:t>个，总体来说，有提升，但是提升效果特别微小。</a:t>
+            </a:r>
+            <a:endParaRPr lang="en-US" altLang="zh-CN" sz="2400" dirty="0"/>
+          </a:p>
+          <a:p>
+            <a:r>
+              <a:rPr lang="zh-CN" altLang="en-US" dirty="0"/>
+              <a:t>进一步实验思路</a:t>
+            </a:r>
+            <a:endParaRPr lang="en-US" altLang="zh-CN" dirty="0"/>
+          </a:p>
+          <a:p>
+            <a:pPr marL="0" indent="0">
+              <a:buNone/>
+            </a:pPr>
+            <a:r>
+              <a:rPr lang="en-US" altLang="zh-CN" sz="2400" dirty="0"/>
+              <a:t>1</a:t>
+            </a:r>
+            <a:r>
+              <a:rPr lang="zh-CN" altLang="en-US" sz="2400" dirty="0"/>
+              <a:t>、随机生成</a:t>
+            </a:r>
+            <a:r>
+              <a:rPr lang="en-US" altLang="zh-CN" sz="2400" dirty="0"/>
+              <a:t>20</a:t>
+            </a:r>
+            <a:r>
+              <a:rPr lang="zh-CN" altLang="en-US" sz="2400" dirty="0"/>
+              <a:t>个数据，更改不同的</a:t>
+            </a:r>
+            <a:r>
+              <a:rPr lang="en-US" altLang="zh-CN" sz="2400" dirty="0" err="1"/>
+              <a:t>hidden_size</a:t>
+            </a:r>
+            <a:endParaRPr lang="en-US" altLang="zh-CN" sz="2400" dirty="0"/>
+          </a:p>
+          <a:p>
+            <a:pPr marL="0" indent="0">
+              <a:buNone/>
+            </a:pPr>
+            <a:r>
+              <a:rPr lang="en-US" altLang="zh-CN" sz="2400" dirty="0"/>
+              <a:t>2</a:t>
+            </a:r>
+            <a:r>
+              <a:rPr lang="zh-CN" altLang="en-US" sz="2400" dirty="0"/>
+              <a:t>、计算皮尔森系数时，只计算</a:t>
+            </a:r>
+            <a:r>
+              <a:rPr lang="en-US" altLang="zh-CN" sz="2400" dirty="0"/>
+              <a:t>15</a:t>
+            </a:r>
+            <a:r>
+              <a:rPr lang="zh-CN" altLang="en-US" sz="2400" dirty="0"/>
+              <a:t>天的</a:t>
+            </a:r>
+            <a:endParaRPr lang="en-US" altLang="zh-CN" sz="2400" dirty="0"/>
+          </a:p>
+        </p:txBody>
+      </p:sp>
+    </p:spTree>
+    <p:extLst>
+      <p:ext uri="{BB962C8B-B14F-4D97-AF65-F5344CB8AC3E}">
+        <p14:creationId xmlns:p14="http://schemas.microsoft.com/office/powerpoint/2010/main" val="2058513385"/>
+      </p:ext>
+    </p:extLst>
+  </p:cSld>
+  <p:clrMapOvr>
+    <a:masterClrMapping/>
+  </p:clrMapOvr>
+</p:sld>
+</file>
+
 <file path=ppt/slides/slide2.xml><?xml version="1.0" encoding="utf-8"?>
 <p:sld xmlns:a="http://schemas.openxmlformats.org/drawingml/2006/main" xmlns:r="http://schemas.openxmlformats.org/officeDocument/2006/relationships" xmlns:p="http://schemas.openxmlformats.org/presentationml/2006/main">
   <p:cSld>
@@ -5328,6 +6130,547 @@
     <p:extLst>
       <p:ext uri="{BB962C8B-B14F-4D97-AF65-F5344CB8AC3E}">
         <p14:creationId xmlns:p14="http://schemas.microsoft.com/office/powerpoint/2010/main" val="3104033377"/>
+      </p:ext>
+    </p:extLst>
+  </p:cSld>
+  <p:clrMapOvr>
+    <a:masterClrMapping/>
+  </p:clrMapOvr>
+</p:sld>
+</file>
+
+<file path=ppt/slides/slide8.xml><?xml version="1.0" encoding="utf-8"?>
+<p:sld xmlns:a="http://schemas.openxmlformats.org/drawingml/2006/main" xmlns:r="http://schemas.openxmlformats.org/officeDocument/2006/relationships" xmlns:p="http://schemas.openxmlformats.org/presentationml/2006/main">
+  <p:cSld>
+    <p:spTree>
+      <p:nvGrpSpPr>
+        <p:cNvPr id="1" name=""/>
+        <p:cNvGrpSpPr/>
+        <p:nvPr/>
+      </p:nvGrpSpPr>
+      <p:grpSpPr>
+        <a:xfrm>
+          <a:off x="0" y="0"/>
+          <a:ext cx="0" cy="0"/>
+          <a:chOff x="0" y="0"/>
+          <a:chExt cx="0" cy="0"/>
+        </a:xfrm>
+      </p:grpSpPr>
+      <p:sp>
+        <p:nvSpPr>
+          <p:cNvPr id="2" name="标题 1">
+            <a:extLst>
+              <a:ext uri="{FF2B5EF4-FFF2-40B4-BE49-F238E27FC236}">
+                <a16:creationId xmlns:a16="http://schemas.microsoft.com/office/drawing/2014/main" id="{4DFA7FAB-A4D2-4172-A0D9-558DC1EACBA8}"/>
+              </a:ext>
+            </a:extLst>
+          </p:cNvPr>
+          <p:cNvSpPr>
+            <a:spLocks noGrp="1"/>
+          </p:cNvSpPr>
+          <p:nvPr>
+            <p:ph type="title"/>
+          </p:nvPr>
+        </p:nvSpPr>
+        <p:spPr/>
+        <p:txBody>
+          <a:bodyPr/>
+          <a:lstStyle/>
+          <a:p>
+            <a:r>
+              <a:rPr lang="zh-CN" altLang="en-US" dirty="0"/>
+              <a:t>第八次讨论会</a:t>
+            </a:r>
+          </a:p>
+        </p:txBody>
+      </p:sp>
+      <p:sp>
+        <p:nvSpPr>
+          <p:cNvPr id="3" name="内容占位符 2">
+            <a:extLst>
+              <a:ext uri="{FF2B5EF4-FFF2-40B4-BE49-F238E27FC236}">
+                <a16:creationId xmlns:a16="http://schemas.microsoft.com/office/drawing/2014/main" id="{96C1E1F4-1389-48CC-AB7A-D7A31690A139}"/>
+              </a:ext>
+            </a:extLst>
+          </p:cNvPr>
+          <p:cNvSpPr>
+            <a:spLocks noGrp="1"/>
+          </p:cNvSpPr>
+          <p:nvPr>
+            <p:ph idx="1"/>
+          </p:nvPr>
+        </p:nvSpPr>
+        <p:spPr/>
+        <p:txBody>
+          <a:bodyPr/>
+          <a:lstStyle/>
+          <a:p>
+            <a:r>
+              <a:rPr lang="zh-CN" altLang="en-US" dirty="0"/>
+              <a:t>总结</a:t>
+            </a:r>
+            <a:endParaRPr lang="en-US" altLang="zh-CN" dirty="0"/>
+          </a:p>
+          <a:p>
+            <a:pPr marL="0" indent="0">
+              <a:buNone/>
+            </a:pPr>
+            <a:r>
+              <a:rPr lang="zh-CN" altLang="en-US" dirty="0"/>
+              <a:t>输入数据中加入历史降水量数据</a:t>
+            </a:r>
+          </a:p>
+        </p:txBody>
+      </p:sp>
+      <p:sp>
+        <p:nvSpPr>
+          <p:cNvPr id="4" name="日期占位符 3">
+            <a:extLst>
+              <a:ext uri="{FF2B5EF4-FFF2-40B4-BE49-F238E27FC236}">
+                <a16:creationId xmlns:a16="http://schemas.microsoft.com/office/drawing/2014/main" id="{DD87B46F-0B81-4E4E-8D99-B9634D5669B3}"/>
+              </a:ext>
+            </a:extLst>
+          </p:cNvPr>
+          <p:cNvSpPr>
+            <a:spLocks noGrp="1"/>
+          </p:cNvSpPr>
+          <p:nvPr>
+            <p:ph type="dt" sz="half" idx="10"/>
+          </p:nvPr>
+        </p:nvSpPr>
+        <p:spPr/>
+        <p:txBody>
+          <a:bodyPr/>
+          <a:lstStyle/>
+          <a:p>
+            <a:r>
+              <a:rPr lang="en-US" altLang="zh-CN" dirty="0"/>
+              <a:t>2020/12/1</a:t>
+            </a:r>
+            <a:endParaRPr lang="zh-CN" altLang="en-US" dirty="0"/>
+          </a:p>
+        </p:txBody>
+      </p:sp>
+    </p:spTree>
+    <p:extLst>
+      <p:ext uri="{BB962C8B-B14F-4D97-AF65-F5344CB8AC3E}">
+        <p14:creationId xmlns:p14="http://schemas.microsoft.com/office/powerpoint/2010/main" val="2676199611"/>
+      </p:ext>
+    </p:extLst>
+  </p:cSld>
+  <p:clrMapOvr>
+    <a:masterClrMapping/>
+  </p:clrMapOvr>
+</p:sld>
+</file>
+
+<file path=ppt/slides/slide9.xml><?xml version="1.0" encoding="utf-8"?>
+<p:sld xmlns:a="http://schemas.openxmlformats.org/drawingml/2006/main" xmlns:r="http://schemas.openxmlformats.org/officeDocument/2006/relationships" xmlns:p="http://schemas.openxmlformats.org/presentationml/2006/main">
+  <p:cSld>
+    <p:spTree>
+      <p:nvGrpSpPr>
+        <p:cNvPr id="1" name=""/>
+        <p:cNvGrpSpPr/>
+        <p:nvPr/>
+      </p:nvGrpSpPr>
+      <p:grpSpPr>
+        <a:xfrm>
+          <a:off x="0" y="0"/>
+          <a:ext cx="0" cy="0"/>
+          <a:chOff x="0" y="0"/>
+          <a:chExt cx="0" cy="0"/>
+        </a:xfrm>
+      </p:grpSpPr>
+      <p:sp>
+        <p:nvSpPr>
+          <p:cNvPr id="2" name="标题 1">
+            <a:extLst>
+              <a:ext uri="{FF2B5EF4-FFF2-40B4-BE49-F238E27FC236}">
+                <a16:creationId xmlns:a16="http://schemas.microsoft.com/office/drawing/2014/main" id="{C16D357E-0148-47EA-8237-0664E922BA0C}"/>
+              </a:ext>
+            </a:extLst>
+          </p:cNvPr>
+          <p:cNvSpPr>
+            <a:spLocks noGrp="1"/>
+          </p:cNvSpPr>
+          <p:nvPr>
+            <p:ph type="title"/>
+          </p:nvPr>
+        </p:nvSpPr>
+        <p:spPr/>
+        <p:txBody>
+          <a:bodyPr/>
+          <a:lstStyle/>
+          <a:p>
+            <a:r>
+              <a:rPr lang="zh-CN" altLang="en-US" dirty="0"/>
+              <a:t>第九次讨论会</a:t>
+            </a:r>
+          </a:p>
+        </p:txBody>
+      </p:sp>
+      <p:sp>
+        <p:nvSpPr>
+          <p:cNvPr id="3" name="内容占位符 2">
+            <a:extLst>
+              <a:ext uri="{FF2B5EF4-FFF2-40B4-BE49-F238E27FC236}">
+                <a16:creationId xmlns:a16="http://schemas.microsoft.com/office/drawing/2014/main" id="{F61A692D-C980-453A-99ED-D195F64C2E94}"/>
+              </a:ext>
+            </a:extLst>
+          </p:cNvPr>
+          <p:cNvSpPr>
+            <a:spLocks noGrp="1"/>
+          </p:cNvSpPr>
+          <p:nvPr>
+            <p:ph idx="1"/>
+          </p:nvPr>
+        </p:nvSpPr>
+        <p:spPr/>
+        <p:txBody>
+          <a:bodyPr/>
+          <a:lstStyle/>
+          <a:p>
+            <a:pPr>
+              <a:buFont typeface="Wingdings" panose="05000000000000000000" pitchFamily="2" charset="2"/>
+              <a:buChar char="Ø"/>
+            </a:pPr>
+            <a:r>
+              <a:rPr lang="zh-CN" altLang="en-US" dirty="0"/>
+              <a:t>各点的皮尔森系数分布情况</a:t>
+            </a:r>
+            <a:endParaRPr lang="en-US" altLang="zh-CN" dirty="0"/>
+          </a:p>
+          <a:p>
+            <a:pPr>
+              <a:buFont typeface="Wingdings" panose="05000000000000000000" pitchFamily="2" charset="2"/>
+              <a:buChar char="Ø"/>
+            </a:pPr>
+            <a:endParaRPr lang="zh-CN" altLang="en-US" dirty="0"/>
+          </a:p>
+        </p:txBody>
+      </p:sp>
+      <p:pic>
+        <p:nvPicPr>
+          <p:cNvPr id="2050" name="Picture 2">
+            <a:extLst>
+              <a:ext uri="{FF2B5EF4-FFF2-40B4-BE49-F238E27FC236}">
+                <a16:creationId xmlns:a16="http://schemas.microsoft.com/office/drawing/2014/main" id="{3265704F-3E17-4703-ABED-F673703E661C}"/>
+              </a:ext>
+            </a:extLst>
+          </p:cNvPr>
+          <p:cNvPicPr>
+            <a:picLocks noChangeAspect="1" noChangeArrowheads="1"/>
+          </p:cNvPicPr>
+          <p:nvPr/>
+        </p:nvPicPr>
+        <p:blipFill>
+          <a:blip r:embed="rId2">
+            <a:extLst>
+              <a:ext uri="{28A0092B-C50C-407E-A947-70E740481C1C}">
+                <a14:useLocalDpi xmlns:a14="http://schemas.microsoft.com/office/drawing/2010/main" val="0"/>
+              </a:ext>
+            </a:extLst>
+          </a:blip>
+          <a:srcRect/>
+          <a:stretch>
+            <a:fillRect/>
+          </a:stretch>
+        </p:blipFill>
+        <p:spPr bwMode="auto">
+          <a:xfrm>
+            <a:off x="1148861" y="2537619"/>
+            <a:ext cx="5315556" cy="3639344"/>
+          </a:xfrm>
+          <a:prstGeom prst="rect">
+            <a:avLst/>
+          </a:prstGeom>
+          <a:noFill/>
+          <a:extLst>
+            <a:ext uri="{909E8E84-426E-40DD-AFC4-6F175D3DCCD1}">
+              <a14:hiddenFill xmlns:a14="http://schemas.microsoft.com/office/drawing/2010/main">
+                <a:solidFill>
+                  <a:srgbClr val="FFFFFF"/>
+                </a:solidFill>
+              </a14:hiddenFill>
+            </a:ext>
+          </a:extLst>
+        </p:spPr>
+      </p:pic>
+      <p:sp>
+        <p:nvSpPr>
+          <p:cNvPr id="4" name="文本框 3">
+            <a:extLst>
+              <a:ext uri="{FF2B5EF4-FFF2-40B4-BE49-F238E27FC236}">
+                <a16:creationId xmlns:a16="http://schemas.microsoft.com/office/drawing/2014/main" id="{AAADF776-3145-47F2-BB47-36B7706D7D61}"/>
+              </a:ext>
+            </a:extLst>
+          </p:cNvPr>
+          <p:cNvSpPr txBox="1"/>
+          <p:nvPr/>
+        </p:nvSpPr>
+        <p:spPr>
+          <a:xfrm>
+            <a:off x="6464417" y="2543053"/>
+            <a:ext cx="5581045" cy="3108543"/>
+          </a:xfrm>
+          <a:prstGeom prst="rect">
+            <a:avLst/>
+          </a:prstGeom>
+          <a:noFill/>
+        </p:spPr>
+        <p:txBody>
+          <a:bodyPr wrap="square" rtlCol="0">
+            <a:spAutoFit/>
+          </a:bodyPr>
+          <a:lstStyle/>
+          <a:p>
+            <a:r>
+              <a:rPr lang="zh-CN" altLang="en-US" sz="2800" dirty="0"/>
+              <a:t>结果的另外一些数据统计分析</a:t>
+            </a:r>
+            <a:r>
+              <a:rPr lang="zh-CN" altLang="en-US" sz="2400" dirty="0"/>
+              <a:t>：</a:t>
+            </a:r>
+            <a:endParaRPr lang="en-US" altLang="zh-CN" sz="2400" dirty="0"/>
+          </a:p>
+          <a:p>
+            <a:r>
+              <a:rPr lang="zh-CN" altLang="en-US" sz="2400" dirty="0"/>
+              <a:t>空间总点数：</a:t>
+            </a:r>
+            <a:r>
+              <a:rPr lang="en-US" altLang="zh-CN" sz="2400" dirty="0"/>
+              <a:t>946</a:t>
+            </a:r>
+          </a:p>
+          <a:p>
+            <a:r>
+              <a:rPr lang="zh-CN" altLang="en-US" sz="2400" dirty="0"/>
+              <a:t>预测皮尔森系数大于</a:t>
+            </a:r>
+            <a:r>
+              <a:rPr lang="en-US" altLang="zh-CN" sz="2400" dirty="0"/>
+              <a:t>0.6</a:t>
+            </a:r>
+            <a:r>
+              <a:rPr lang="zh-CN" altLang="en-US" sz="2400" dirty="0"/>
+              <a:t>点数：</a:t>
+            </a:r>
+            <a:r>
+              <a:rPr lang="en-US" altLang="zh-CN" sz="2400" dirty="0"/>
+              <a:t>3     0.3%</a:t>
+            </a:r>
+          </a:p>
+          <a:p>
+            <a:r>
+              <a:rPr lang="zh-CN" altLang="en-US" sz="2400" dirty="0"/>
+              <a:t>预测皮尔森系数大于</a:t>
+            </a:r>
+            <a:r>
+              <a:rPr lang="en-US" altLang="zh-CN" sz="2400" dirty="0"/>
+              <a:t>0.5</a:t>
+            </a:r>
+            <a:r>
+              <a:rPr lang="zh-CN" altLang="en-US" sz="2400" dirty="0"/>
+              <a:t>点数：</a:t>
+            </a:r>
+            <a:r>
+              <a:rPr lang="en-US" altLang="zh-CN" sz="2400" dirty="0"/>
+              <a:t>13   1.3%</a:t>
+            </a:r>
+          </a:p>
+          <a:p>
+            <a:r>
+              <a:rPr lang="zh-CN" altLang="en-US" sz="2400" dirty="0"/>
+              <a:t>预测皮尔森系数大于</a:t>
+            </a:r>
+            <a:r>
+              <a:rPr lang="en-US" altLang="zh-CN" sz="2400" dirty="0"/>
+              <a:t>0.4</a:t>
+            </a:r>
+            <a:r>
+              <a:rPr lang="zh-CN" altLang="en-US" sz="2400" dirty="0"/>
+              <a:t>点数：</a:t>
+            </a:r>
+            <a:r>
+              <a:rPr lang="en-US" altLang="zh-CN" sz="2400" dirty="0"/>
+              <a:t>60   5.9%</a:t>
+            </a:r>
+          </a:p>
+          <a:p>
+            <a:r>
+              <a:rPr lang="zh-CN" altLang="en-US" sz="2400" dirty="0"/>
+              <a:t>预测皮尔森系数大于</a:t>
+            </a:r>
+            <a:r>
+              <a:rPr lang="en-US" altLang="zh-CN" sz="2400" dirty="0"/>
+              <a:t>0.3</a:t>
+            </a:r>
+            <a:r>
+              <a:rPr lang="zh-CN" altLang="en-US" sz="2400" dirty="0"/>
+              <a:t>点数：</a:t>
+            </a:r>
+            <a:r>
+              <a:rPr lang="en-US" altLang="zh-CN" sz="2400" dirty="0"/>
+              <a:t>168 16.6%</a:t>
+            </a:r>
+          </a:p>
+          <a:p>
+            <a:r>
+              <a:rPr lang="zh-CN" altLang="en-US" sz="2400" dirty="0"/>
+              <a:t>预测皮尔森系数的最大值：  </a:t>
+            </a:r>
+            <a:r>
+              <a:rPr kumimoji="0" lang="zh-CN" altLang="zh-CN" sz="2400" b="0" i="0" u="none" strike="noStrike" cap="none" normalizeH="0" baseline="0" dirty="0">
+                <a:ln>
+                  <a:noFill/>
+                </a:ln>
+                <a:solidFill>
+                  <a:srgbClr val="000000"/>
+                </a:solidFill>
+                <a:effectLst/>
+                <a:cs typeface="Courier New" panose="02070309020205020404" pitchFamily="49" charset="0"/>
+              </a:rPr>
+              <a:t>0.6092</a:t>
+            </a:r>
+            <a:endParaRPr lang="en-US" altLang="zh-CN" sz="2400" dirty="0"/>
+          </a:p>
+          <a:p>
+            <a:r>
+              <a:rPr lang="zh-CN" altLang="en-US" sz="2400" dirty="0"/>
+              <a:t>预测皮尔森系数的最小值：</a:t>
+            </a:r>
+            <a:r>
+              <a:rPr lang="en-US" altLang="zh-CN" sz="2400" dirty="0"/>
+              <a:t>-0.1099</a:t>
+            </a:r>
+            <a:endParaRPr lang="zh-CN" altLang="en-US" sz="2400" dirty="0"/>
+          </a:p>
+        </p:txBody>
+      </p:sp>
+      <p:sp>
+        <p:nvSpPr>
+          <p:cNvPr id="7" name="Rectangle 5">
+            <a:extLst>
+              <a:ext uri="{FF2B5EF4-FFF2-40B4-BE49-F238E27FC236}">
+                <a16:creationId xmlns:a16="http://schemas.microsoft.com/office/drawing/2014/main" id="{A7D4171B-F3FC-4E9E-B6C1-50ACCB7896A7}"/>
+              </a:ext>
+            </a:extLst>
+          </p:cNvPr>
+          <p:cNvSpPr>
+            <a:spLocks noChangeArrowheads="1"/>
+          </p:cNvSpPr>
+          <p:nvPr/>
+        </p:nvSpPr>
+        <p:spPr bwMode="auto">
+          <a:xfrm>
+            <a:off x="0" y="90100"/>
+            <a:ext cx="65" cy="276999"/>
+          </a:xfrm>
+          <a:prstGeom prst="rect">
+            <a:avLst/>
+          </a:prstGeom>
+          <a:solidFill>
+            <a:srgbClr val="FFFFFF"/>
+          </a:solidFill>
+          <a:ln>
+            <a:noFill/>
+          </a:ln>
+          <a:effectLst/>
+          <a:extLst>
+            <a:ext uri="{91240B29-F687-4F45-9708-019B960494DF}">
+              <a14:hiddenLine xmlns:a14="http://schemas.microsoft.com/office/drawing/2010/main" w="9525">
+                <a:solidFill>
+                  <a:schemeClr val="tx1"/>
+                </a:solidFill>
+                <a:miter lim="800000"/>
+                <a:headEnd/>
+                <a:tailEnd/>
+              </a14:hiddenLine>
+            </a:ext>
+            <a:ext uri="{AF507438-7753-43E0-B8FC-AC1667EBCBE1}">
+              <a14:hiddenEffects xmlns:a14="http://schemas.microsoft.com/office/drawing/2010/main">
+                <a:effectLst>
+                  <a:outerShdw dist="35921" dir="2700000" algn="ctr" rotWithShape="0">
+                    <a:schemeClr val="bg2"/>
+                  </a:outerShdw>
+                </a:effectLst>
+              </a14:hiddenEffects>
+            </a:ext>
+          </a:extLst>
+        </p:spPr>
+        <p:txBody>
+          <a:bodyPr vert="horz" wrap="none" lIns="0" tIns="0" rIns="0" bIns="0" numCol="1" anchor="ctr" anchorCtr="0" compatLnSpc="1">
+            <a:prstTxWarp prst="textNoShape">
+              <a:avLst/>
+            </a:prstTxWarp>
+            <a:spAutoFit/>
+          </a:bodyPr>
+          <a:lstStyle/>
+          <a:p>
+            <a:pPr marL="0" marR="0" lvl="0" indent="0" algn="l" defTabSz="914400" rtl="0" eaLnBrk="0" fontAlgn="base" latinLnBrk="0" hangingPunct="0">
+              <a:lnSpc>
+                <a:spcPct val="100000"/>
+              </a:lnSpc>
+              <a:spcBef>
+                <a:spcPct val="0"/>
+              </a:spcBef>
+              <a:spcAft>
+                <a:spcPct val="0"/>
+              </a:spcAft>
+              <a:buClrTx/>
+              <a:buSzTx/>
+              <a:buFontTx/>
+              <a:buNone/>
+              <a:tabLst/>
+            </a:pPr>
+            <a:endParaRPr kumimoji="0" lang="zh-CN" altLang="zh-CN" sz="1800" b="0" i="0" u="none" strike="noStrike" cap="none" normalizeH="0" baseline="0" dirty="0">
+              <a:ln>
+                <a:noFill/>
+              </a:ln>
+              <a:solidFill>
+                <a:schemeClr val="tx1"/>
+              </a:solidFill>
+              <a:effectLst/>
+              <a:latin typeface="Arial" panose="020B0604020202020204" pitchFamily="34" charset="0"/>
+            </a:endParaRPr>
+          </a:p>
+        </p:txBody>
+      </p:sp>
+      <p:sp>
+        <p:nvSpPr>
+          <p:cNvPr id="8" name="日期占位符 7">
+            <a:extLst>
+              <a:ext uri="{FF2B5EF4-FFF2-40B4-BE49-F238E27FC236}">
+                <a16:creationId xmlns:a16="http://schemas.microsoft.com/office/drawing/2014/main" id="{AFF406AC-3861-4AE8-9F2F-A0FB0DB5B701}"/>
+              </a:ext>
+            </a:extLst>
+          </p:cNvPr>
+          <p:cNvSpPr>
+            <a:spLocks noGrp="1"/>
+          </p:cNvSpPr>
+          <p:nvPr>
+            <p:ph type="dt" sz="half" idx="10"/>
+          </p:nvPr>
+        </p:nvSpPr>
+        <p:spPr/>
+        <p:txBody>
+          <a:bodyPr/>
+          <a:lstStyle/>
+          <a:p>
+            <a:r>
+              <a:rPr lang="en-US" altLang="zh-CN" dirty="0"/>
+              <a:t>2020/12/3</a:t>
+            </a:r>
+            <a:endParaRPr lang="zh-CN" altLang="en-US" dirty="0"/>
+          </a:p>
+        </p:txBody>
+      </p:sp>
+    </p:spTree>
+    <p:extLst>
+      <p:ext uri="{BB962C8B-B14F-4D97-AF65-F5344CB8AC3E}">
+        <p14:creationId xmlns:p14="http://schemas.microsoft.com/office/powerpoint/2010/main" val="3517448099"/>
       </p:ext>
     </p:extLst>
   </p:cSld>

</xml_diff>

<commit_message>
add a expriment about all points data of 10 day in ppt
</commit_message>
<xml_diff>
--- a/workshop_summary.pptx
+++ b/workshop_summary.pptx
@@ -5,7 +5,7 @@
     <p:sldMasterId id="2147483648" r:id="rId1"/>
   </p:sldMasterIdLst>
   <p:notesMasterIdLst>
-    <p:notesMasterId r:id="rId17"/>
+    <p:notesMasterId r:id="rId18"/>
   </p:notesMasterIdLst>
   <p:sldIdLst>
     <p:sldId id="256" r:id="rId2"/>
@@ -23,6 +23,7 @@
     <p:sldId id="268" r:id="rId14"/>
     <p:sldId id="269" r:id="rId15"/>
     <p:sldId id="270" r:id="rId16"/>
+    <p:sldId id="271" r:id="rId17"/>
   </p:sldIdLst>
   <p:sldSz cx="12192000" cy="6858000"/>
   <p:notesSz cx="6858000" cy="9144000"/>
@@ -211,7 +212,7 @@
           <a:p>
             <a:fld id="{7E45A342-5B8C-47A5-A361-1075BECA0050}" type="datetimeFigureOut">
               <a:rPr lang="zh-CN" altLang="en-US" smtClean="0"/>
-              <a:t>2020/12/9</a:t>
+              <a:t>2020/12/10</a:t>
             </a:fld>
             <a:endParaRPr lang="zh-CN" altLang="en-US"/>
           </a:p>
@@ -5326,6 +5327,298 @@
     <p:extLst>
       <p:ext uri="{BB962C8B-B14F-4D97-AF65-F5344CB8AC3E}">
         <p14:creationId xmlns:p14="http://schemas.microsoft.com/office/powerpoint/2010/main" val="525384292"/>
+      </p:ext>
+    </p:extLst>
+  </p:cSld>
+  <p:clrMapOvr>
+    <a:masterClrMapping/>
+  </p:clrMapOvr>
+</p:sld>
+</file>
+
+<file path=ppt/slides/slide16.xml><?xml version="1.0" encoding="utf-8"?>
+<p:sld xmlns:a="http://schemas.openxmlformats.org/drawingml/2006/main" xmlns:r="http://schemas.openxmlformats.org/officeDocument/2006/relationships" xmlns:p="http://schemas.openxmlformats.org/presentationml/2006/main">
+  <p:cSld>
+    <p:spTree>
+      <p:nvGrpSpPr>
+        <p:cNvPr id="1" name=""/>
+        <p:cNvGrpSpPr/>
+        <p:nvPr/>
+      </p:nvGrpSpPr>
+      <p:grpSpPr>
+        <a:xfrm>
+          <a:off x="0" y="0"/>
+          <a:ext cx="0" cy="0"/>
+          <a:chOff x="0" y="0"/>
+          <a:chExt cx="0" cy="0"/>
+        </a:xfrm>
+      </p:grpSpPr>
+      <p:sp>
+        <p:nvSpPr>
+          <p:cNvPr id="2" name="标题 1">
+            <a:extLst>
+              <a:ext uri="{FF2B5EF4-FFF2-40B4-BE49-F238E27FC236}">
+                <a16:creationId xmlns:a16="http://schemas.microsoft.com/office/drawing/2014/main" id="{C0E49966-DEBD-4F78-B686-954819C91E97}"/>
+              </a:ext>
+            </a:extLst>
+          </p:cNvPr>
+          <p:cNvSpPr>
+            <a:spLocks noGrp="1"/>
+          </p:cNvSpPr>
+          <p:nvPr>
+            <p:ph type="title"/>
+          </p:nvPr>
+        </p:nvSpPr>
+        <p:spPr/>
+        <p:txBody>
+          <a:bodyPr/>
+          <a:lstStyle/>
+          <a:p>
+            <a:r>
+              <a:rPr lang="zh-CN" altLang="en-US" dirty="0"/>
+              <a:t>第九次讨论会</a:t>
+            </a:r>
+          </a:p>
+        </p:txBody>
+      </p:sp>
+      <p:sp>
+        <p:nvSpPr>
+          <p:cNvPr id="3" name="内容占位符 2">
+            <a:extLst>
+              <a:ext uri="{FF2B5EF4-FFF2-40B4-BE49-F238E27FC236}">
+                <a16:creationId xmlns:a16="http://schemas.microsoft.com/office/drawing/2014/main" id="{E94C025D-5D9C-48E6-83FA-3F365155647B}"/>
+              </a:ext>
+            </a:extLst>
+          </p:cNvPr>
+          <p:cNvSpPr>
+            <a:spLocks noGrp="1"/>
+          </p:cNvSpPr>
+          <p:nvPr>
+            <p:ph idx="1"/>
+          </p:nvPr>
+        </p:nvSpPr>
+        <p:spPr>
+          <a:xfrm>
+            <a:off x="838200" y="1690688"/>
+            <a:ext cx="10515600" cy="4351338"/>
+          </a:xfrm>
+        </p:spPr>
+        <p:txBody>
+          <a:bodyPr>
+            <a:normAutofit/>
+          </a:bodyPr>
+          <a:lstStyle/>
+          <a:p>
+            <a:pPr marL="0" indent="0">
+              <a:buNone/>
+            </a:pPr>
+            <a:r>
+              <a:rPr lang="zh-CN" altLang="en-US" sz="2400" dirty="0"/>
+              <a:t>使用十天的数据，计算了所有空间点上的皮尔森系数</a:t>
+            </a:r>
+            <a:endParaRPr lang="en-US" altLang="zh-CN" sz="2400" dirty="0"/>
+          </a:p>
+          <a:p>
+            <a:pPr marL="0" indent="0">
+              <a:buNone/>
+            </a:pPr>
+            <a:r>
+              <a:rPr lang="zh-CN" altLang="en-US" sz="2400" dirty="0"/>
+              <a:t>得到了如下的结果：</a:t>
+            </a:r>
+            <a:endParaRPr lang="en-US" altLang="zh-CN" sz="2400" dirty="0"/>
+          </a:p>
+          <a:p>
+            <a:pPr marL="0" indent="0">
+              <a:buNone/>
+            </a:pPr>
+            <a:r>
+              <a:rPr lang="zh-CN" altLang="zh-CN" sz="2400" dirty="0">
+                <a:solidFill>
+                  <a:srgbClr val="000000"/>
+                </a:solidFill>
+                <a:latin typeface="+mn-ea"/>
+              </a:rPr>
+              <a:t>max:0.9858583690991279 </a:t>
+            </a:r>
+            <a:endParaRPr lang="en-US" altLang="zh-CN" sz="2400" dirty="0">
+              <a:solidFill>
+                <a:srgbClr val="000000"/>
+              </a:solidFill>
+              <a:latin typeface="+mn-ea"/>
+            </a:endParaRPr>
+          </a:p>
+          <a:p>
+            <a:pPr marL="0" indent="0">
+              <a:buNone/>
+            </a:pPr>
+            <a:r>
+              <a:rPr lang="zh-CN" altLang="zh-CN" sz="2400" dirty="0">
+                <a:solidFill>
+                  <a:srgbClr val="000000"/>
+                </a:solidFill>
+                <a:latin typeface="+mn-ea"/>
+              </a:rPr>
+              <a:t>min:-0.9594048399046654</a:t>
+            </a:r>
+            <a:r>
+              <a:rPr lang="zh-CN" altLang="zh-CN" sz="2400" dirty="0">
+                <a:latin typeface="+mn-ea"/>
+              </a:rPr>
+              <a:t> </a:t>
+            </a:r>
+          </a:p>
+          <a:p>
+            <a:pPr marL="0" indent="0">
+              <a:buNone/>
+            </a:pPr>
+            <a:r>
+              <a:rPr lang="en-US" altLang="zh-CN" sz="2400" dirty="0"/>
+              <a:t>&gt;0.7 sum=24 </a:t>
+            </a:r>
+            <a:r>
+              <a:rPr lang="zh-CN" altLang="en-US" sz="2400" dirty="0"/>
+              <a:t>占比：</a:t>
+            </a:r>
+            <a:r>
+              <a:rPr lang="en-US" altLang="zh-CN" sz="2400" dirty="0"/>
+              <a:t>2.37%</a:t>
+            </a:r>
+          </a:p>
+          <a:p>
+            <a:pPr marL="0" indent="0">
+              <a:buNone/>
+            </a:pPr>
+            <a:r>
+              <a:rPr lang="en-US" altLang="zh-CN" sz="2400" dirty="0"/>
+              <a:t>&gt;0.6 sum=49 </a:t>
+            </a:r>
+            <a:r>
+              <a:rPr lang="zh-CN" altLang="en-US" sz="2400" dirty="0"/>
+              <a:t>占比：</a:t>
+            </a:r>
+            <a:r>
+              <a:rPr lang="en-US" altLang="zh-CN" sz="2400" dirty="0"/>
+              <a:t>4.84%</a:t>
+            </a:r>
+          </a:p>
+          <a:p>
+            <a:pPr marL="0" indent="0">
+              <a:buNone/>
+            </a:pPr>
+            <a:r>
+              <a:rPr lang="en-US" altLang="zh-CN" sz="2400" dirty="0"/>
+              <a:t>&gt;0.5 sum=101 </a:t>
+            </a:r>
+            <a:r>
+              <a:rPr lang="zh-CN" altLang="en-US" sz="2400" dirty="0"/>
+              <a:t>占比：</a:t>
+            </a:r>
+            <a:r>
+              <a:rPr lang="en-US" altLang="zh-CN" sz="2400" dirty="0"/>
+              <a:t>9.98%</a:t>
+            </a:r>
+          </a:p>
+          <a:p>
+            <a:pPr marL="0" indent="0">
+              <a:buNone/>
+            </a:pPr>
+            <a:r>
+              <a:rPr lang="en-US" altLang="zh-CN" sz="2400" dirty="0"/>
+              <a:t>&gt;0.4 sum=179 </a:t>
+            </a:r>
+            <a:r>
+              <a:rPr lang="zh-CN" altLang="en-US" sz="2400" dirty="0"/>
+              <a:t>占比：</a:t>
+            </a:r>
+            <a:r>
+              <a:rPr lang="en-US" altLang="zh-CN" sz="2400" dirty="0"/>
+              <a:t>17.69%</a:t>
+            </a:r>
+            <a:endParaRPr lang="zh-CN" altLang="en-US" sz="2400" dirty="0"/>
+          </a:p>
+        </p:txBody>
+      </p:sp>
+      <p:sp>
+        <p:nvSpPr>
+          <p:cNvPr id="4" name="日期占位符 3">
+            <a:extLst>
+              <a:ext uri="{FF2B5EF4-FFF2-40B4-BE49-F238E27FC236}">
+                <a16:creationId xmlns:a16="http://schemas.microsoft.com/office/drawing/2014/main" id="{F89C8260-4A77-4102-9676-B824839E2216}"/>
+              </a:ext>
+            </a:extLst>
+          </p:cNvPr>
+          <p:cNvSpPr>
+            <a:spLocks noGrp="1"/>
+          </p:cNvSpPr>
+          <p:nvPr>
+            <p:ph type="dt" sz="half" idx="10"/>
+          </p:nvPr>
+        </p:nvSpPr>
+        <p:spPr/>
+        <p:txBody>
+          <a:bodyPr/>
+          <a:lstStyle/>
+          <a:p>
+            <a:r>
+              <a:rPr lang="en-US" altLang="zh-CN"/>
+              <a:t>2020/11/27</a:t>
+            </a:r>
+            <a:endParaRPr lang="zh-CN" altLang="en-US"/>
+          </a:p>
+        </p:txBody>
+      </p:sp>
+      <p:pic>
+        <p:nvPicPr>
+          <p:cNvPr id="1027" name="Picture 3">
+            <a:extLst>
+              <a:ext uri="{FF2B5EF4-FFF2-40B4-BE49-F238E27FC236}">
+                <a16:creationId xmlns:a16="http://schemas.microsoft.com/office/drawing/2014/main" id="{CB48023A-E767-4316-9627-499512993592}"/>
+              </a:ext>
+            </a:extLst>
+          </p:cNvPr>
+          <p:cNvPicPr>
+            <a:picLocks noChangeAspect="1" noChangeArrowheads="1"/>
+          </p:cNvPicPr>
+          <p:nvPr/>
+        </p:nvPicPr>
+        <p:blipFill>
+          <a:blip r:embed="rId2">
+            <a:extLst>
+              <a:ext uri="{28A0092B-C50C-407E-A947-70E740481C1C}">
+                <a14:useLocalDpi xmlns:a14="http://schemas.microsoft.com/office/drawing/2010/main" val="0"/>
+              </a:ext>
+            </a:extLst>
+          </a:blip>
+          <a:srcRect/>
+          <a:stretch>
+            <a:fillRect/>
+          </a:stretch>
+        </p:blipFill>
+        <p:spPr bwMode="auto">
+          <a:xfrm>
+            <a:off x="4942768" y="1839657"/>
+            <a:ext cx="6796402" cy="4653218"/>
+          </a:xfrm>
+          <a:prstGeom prst="rect">
+            <a:avLst/>
+          </a:prstGeom>
+          <a:noFill/>
+          <a:extLst>
+            <a:ext uri="{909E8E84-426E-40DD-AFC4-6F175D3DCCD1}">
+              <a14:hiddenFill xmlns:a14="http://schemas.microsoft.com/office/drawing/2010/main">
+                <a:solidFill>
+                  <a:srgbClr val="FFFFFF"/>
+                </a:solidFill>
+              </a14:hiddenFill>
+            </a:ext>
+          </a:extLst>
+        </p:spPr>
+      </p:pic>
+    </p:spTree>
+    <p:extLst>
+      <p:ext uri="{BB962C8B-B14F-4D97-AF65-F5344CB8AC3E}">
+        <p14:creationId xmlns:p14="http://schemas.microsoft.com/office/powerpoint/2010/main" val="593345154"/>
       </p:ext>
     </p:extLst>
   </p:cSld>

</xml_diff>

<commit_message>
add world hot map
</commit_message>
<xml_diff>
--- a/workshop_summary.pptx
+++ b/workshop_summary.pptx
@@ -5,7 +5,7 @@
     <p:sldMasterId id="2147483648" r:id="rId1"/>
   </p:sldMasterIdLst>
   <p:notesMasterIdLst>
-    <p:notesMasterId r:id="rId18"/>
+    <p:notesMasterId r:id="rId19"/>
   </p:notesMasterIdLst>
   <p:sldIdLst>
     <p:sldId id="256" r:id="rId2"/>
@@ -24,6 +24,7 @@
     <p:sldId id="269" r:id="rId15"/>
     <p:sldId id="270" r:id="rId16"/>
     <p:sldId id="271" r:id="rId17"/>
+    <p:sldId id="272" r:id="rId18"/>
   </p:sldIdLst>
   <p:sldSz cx="12192000" cy="6858000"/>
   <p:notesSz cx="6858000" cy="9144000"/>
@@ -212,7 +213,7 @@
           <a:p>
             <a:fld id="{7E45A342-5B8C-47A5-A361-1075BECA0050}" type="datetimeFigureOut">
               <a:rPr lang="zh-CN" altLang="en-US" smtClean="0"/>
-              <a:t>2020/12/10</a:t>
+              <a:t>2020/12/16</a:t>
             </a:fld>
             <a:endParaRPr lang="zh-CN" altLang="en-US"/>
           </a:p>
@@ -5619,6 +5620,478 @@
     <p:extLst>
       <p:ext uri="{BB962C8B-B14F-4D97-AF65-F5344CB8AC3E}">
         <p14:creationId xmlns:p14="http://schemas.microsoft.com/office/powerpoint/2010/main" val="593345154"/>
+      </p:ext>
+    </p:extLst>
+  </p:cSld>
+  <p:clrMapOvr>
+    <a:masterClrMapping/>
+  </p:clrMapOvr>
+</p:sld>
+</file>
+
+<file path=ppt/slides/slide17.xml><?xml version="1.0" encoding="utf-8"?>
+<p:sld xmlns:a="http://schemas.openxmlformats.org/drawingml/2006/main" xmlns:r="http://schemas.openxmlformats.org/officeDocument/2006/relationships" xmlns:p="http://schemas.openxmlformats.org/presentationml/2006/main">
+  <p:cSld>
+    <p:spTree>
+      <p:nvGrpSpPr>
+        <p:cNvPr id="1" name=""/>
+        <p:cNvGrpSpPr/>
+        <p:nvPr/>
+      </p:nvGrpSpPr>
+      <p:grpSpPr>
+        <a:xfrm>
+          <a:off x="0" y="0"/>
+          <a:ext cx="0" cy="0"/>
+          <a:chOff x="0" y="0"/>
+          <a:chExt cx="0" cy="0"/>
+        </a:xfrm>
+      </p:grpSpPr>
+      <p:sp>
+        <p:nvSpPr>
+          <p:cNvPr id="2" name="标题 1">
+            <a:extLst>
+              <a:ext uri="{FF2B5EF4-FFF2-40B4-BE49-F238E27FC236}">
+                <a16:creationId xmlns:a16="http://schemas.microsoft.com/office/drawing/2014/main" id="{802FF314-7342-4FE0-B0C0-9740B00B857D}"/>
+              </a:ext>
+            </a:extLst>
+          </p:cNvPr>
+          <p:cNvSpPr>
+            <a:spLocks noGrp="1"/>
+          </p:cNvSpPr>
+          <p:nvPr>
+            <p:ph type="title"/>
+          </p:nvPr>
+        </p:nvSpPr>
+        <p:spPr/>
+        <p:txBody>
+          <a:bodyPr/>
+          <a:lstStyle/>
+          <a:p>
+            <a:r>
+              <a:rPr lang="zh-CN" altLang="en-US" dirty="0"/>
+              <a:t>第九次讨论会</a:t>
+            </a:r>
+          </a:p>
+        </p:txBody>
+      </p:sp>
+      <mc:AlternateContent xmlns:mc="http://schemas.openxmlformats.org/markup-compatibility/2006">
+        <mc:Choice xmlns:a14="http://schemas.microsoft.com/office/drawing/2010/main" Requires="a14">
+          <p:sp>
+            <p:nvSpPr>
+              <p:cNvPr id="3" name="内容占位符 2">
+                <a:extLst>
+                  <a:ext uri="{FF2B5EF4-FFF2-40B4-BE49-F238E27FC236}">
+                    <a16:creationId xmlns:a16="http://schemas.microsoft.com/office/drawing/2014/main" id="{B8797070-FA31-4CD3-90F1-983F0E2F2111}"/>
+                  </a:ext>
+                </a:extLst>
+              </p:cNvPr>
+              <p:cNvSpPr>
+                <a:spLocks noGrp="1"/>
+              </p:cNvSpPr>
+              <p:nvPr>
+                <p:ph idx="1"/>
+              </p:nvPr>
+            </p:nvSpPr>
+            <p:spPr/>
+            <p:txBody>
+              <a:bodyPr/>
+              <a:lstStyle/>
+              <a:p>
+                <a:r>
+                  <a:rPr lang="zh-CN" altLang="en-US" dirty="0"/>
+                  <a:t>总结</a:t>
+                </a:r>
+                <a:endParaRPr lang="en-US" altLang="zh-CN" dirty="0"/>
+              </a:p>
+              <a:p>
+                <a:pPr marL="0" indent="0">
+                  <a:buNone/>
+                </a:pPr>
+                <a14:m>
+                  <m:oMathPara xmlns:m="http://schemas.openxmlformats.org/officeDocument/2006/math">
+                    <m:oMathParaPr>
+                      <m:jc m:val="centerGroup"/>
+                    </m:oMathParaPr>
+                    <m:oMath xmlns:m="http://schemas.openxmlformats.org/officeDocument/2006/math">
+                      <m:r>
+                        <a:rPr lang="en-US" altLang="zh-CN" b="0" i="1" smtClean="0">
+                          <a:latin typeface="Cambria Math" panose="02040503050406030204" pitchFamily="18" charset="0"/>
+                        </a:rPr>
+                        <m:t>𝑓</m:t>
+                      </m:r>
+                      <m:d>
+                        <m:dPr>
+                          <m:ctrlPr>
+                            <a:rPr lang="en-US" altLang="zh-CN" b="0" i="1" smtClean="0">
+                              <a:latin typeface="Cambria Math" panose="02040503050406030204" pitchFamily="18" charset="0"/>
+                            </a:rPr>
+                          </m:ctrlPr>
+                        </m:dPr>
+                        <m:e>
+                          <m:r>
+                            <a:rPr lang="en-US" altLang="zh-CN" b="0" i="1" smtClean="0">
+                              <a:latin typeface="Cambria Math" panose="02040503050406030204" pitchFamily="18" charset="0"/>
+                            </a:rPr>
+                            <m:t>𝑥</m:t>
+                          </m:r>
+                          <m:r>
+                            <a:rPr lang="en-US" altLang="zh-CN" b="0" i="1" smtClean="0">
+                              <a:latin typeface="Cambria Math" panose="02040503050406030204" pitchFamily="18" charset="0"/>
+                            </a:rPr>
+                            <m:t>,</m:t>
+                          </m:r>
+                          <m:r>
+                            <a:rPr lang="en-US" altLang="zh-CN" b="0" i="1" smtClean="0">
+                              <a:latin typeface="Cambria Math" panose="02040503050406030204" pitchFamily="18" charset="0"/>
+                            </a:rPr>
+                            <m:t>𝑦</m:t>
+                          </m:r>
+                          <m:r>
+                            <a:rPr lang="en-US" altLang="zh-CN" b="0" i="1" smtClean="0">
+                              <a:latin typeface="Cambria Math" panose="02040503050406030204" pitchFamily="18" charset="0"/>
+                            </a:rPr>
+                            <m:t>,</m:t>
+                          </m:r>
+                          <m:r>
+                            <a:rPr lang="en-US" altLang="zh-CN" b="0" i="1" smtClean="0">
+                              <a:latin typeface="Cambria Math" panose="02040503050406030204" pitchFamily="18" charset="0"/>
+                            </a:rPr>
+                            <m:t>𝑡</m:t>
+                          </m:r>
+                        </m:e>
+                      </m:d>
+                      <m:r>
+                        <a:rPr lang="en-US" altLang="zh-CN" b="0" i="1" smtClean="0">
+                          <a:latin typeface="Cambria Math" panose="02040503050406030204" pitchFamily="18" charset="0"/>
+                        </a:rPr>
+                        <m:t>=</m:t>
+                      </m:r>
+                      <m:sSub>
+                        <m:sSubPr>
+                          <m:ctrlPr>
+                            <a:rPr lang="en-US" altLang="zh-CN" b="0" i="1" smtClean="0">
+                              <a:latin typeface="Cambria Math" panose="02040503050406030204" pitchFamily="18" charset="0"/>
+                            </a:rPr>
+                          </m:ctrlPr>
+                        </m:sSubPr>
+                        <m:e>
+                          <m:r>
+                            <a:rPr lang="en-US" altLang="zh-CN" b="0" i="1" smtClean="0">
+                              <a:latin typeface="Cambria Math" panose="02040503050406030204" pitchFamily="18" charset="0"/>
+                            </a:rPr>
+                            <m:t>𝐹</m:t>
+                          </m:r>
+                        </m:e>
+                        <m:sub>
+                          <m:r>
+                            <a:rPr lang="en-US" altLang="zh-CN" b="0" i="1" smtClean="0">
+                              <a:latin typeface="Cambria Math" panose="02040503050406030204" pitchFamily="18" charset="0"/>
+                            </a:rPr>
+                            <m:t>1</m:t>
+                          </m:r>
+                        </m:sub>
+                      </m:sSub>
+                      <m:d>
+                        <m:dPr>
+                          <m:ctrlPr>
+                            <a:rPr lang="en-US" altLang="zh-CN" b="0" i="1" smtClean="0">
+                              <a:latin typeface="Cambria Math" panose="02040503050406030204" pitchFamily="18" charset="0"/>
+                            </a:rPr>
+                          </m:ctrlPr>
+                        </m:dPr>
+                        <m:e>
+                          <m:r>
+                            <a:rPr lang="en-US" altLang="zh-CN" b="0" i="1" smtClean="0">
+                              <a:latin typeface="Cambria Math" panose="02040503050406030204" pitchFamily="18" charset="0"/>
+                            </a:rPr>
+                            <m:t>𝑥</m:t>
+                          </m:r>
+                          <m:r>
+                            <a:rPr lang="en-US" altLang="zh-CN" b="0" i="1" smtClean="0">
+                              <a:latin typeface="Cambria Math" panose="02040503050406030204" pitchFamily="18" charset="0"/>
+                            </a:rPr>
+                            <m:t>,</m:t>
+                          </m:r>
+                          <m:r>
+                            <a:rPr lang="en-US" altLang="zh-CN" b="0" i="1" smtClean="0">
+                              <a:latin typeface="Cambria Math" panose="02040503050406030204" pitchFamily="18" charset="0"/>
+                            </a:rPr>
+                            <m:t>𝑦</m:t>
+                          </m:r>
+                        </m:e>
+                      </m:d>
+                      <m:r>
+                        <a:rPr lang="en-US" altLang="zh-CN" i="1">
+                          <a:latin typeface="Cambria Math" panose="02040503050406030204" pitchFamily="18" charset="0"/>
+                          <a:ea typeface="Cambria Math" panose="02040503050406030204" pitchFamily="18" charset="0"/>
+                        </a:rPr>
+                        <m:t>×</m:t>
+                      </m:r>
+                      <m:sSub>
+                        <m:sSubPr>
+                          <m:ctrlPr>
+                            <a:rPr lang="en-US" altLang="zh-CN" b="0" i="1" smtClean="0">
+                              <a:latin typeface="Cambria Math" panose="02040503050406030204" pitchFamily="18" charset="0"/>
+                            </a:rPr>
+                          </m:ctrlPr>
+                        </m:sSubPr>
+                        <m:e>
+                          <m:r>
+                            <a:rPr lang="en-US" altLang="zh-CN" b="0" i="1" smtClean="0">
+                              <a:latin typeface="Cambria Math" panose="02040503050406030204" pitchFamily="18" charset="0"/>
+                            </a:rPr>
+                            <m:t>𝐺</m:t>
+                          </m:r>
+                        </m:e>
+                        <m:sub>
+                          <m:r>
+                            <a:rPr lang="en-US" altLang="zh-CN" b="0" i="1" smtClean="0">
+                              <a:latin typeface="Cambria Math" panose="02040503050406030204" pitchFamily="18" charset="0"/>
+                            </a:rPr>
+                            <m:t>1</m:t>
+                          </m:r>
+                        </m:sub>
+                      </m:sSub>
+                      <m:d>
+                        <m:dPr>
+                          <m:ctrlPr>
+                            <a:rPr lang="en-US" altLang="zh-CN" b="0" i="1" smtClean="0">
+                              <a:latin typeface="Cambria Math" panose="02040503050406030204" pitchFamily="18" charset="0"/>
+                            </a:rPr>
+                          </m:ctrlPr>
+                        </m:dPr>
+                        <m:e>
+                          <m:r>
+                            <a:rPr lang="en-US" altLang="zh-CN" b="0" i="1" smtClean="0">
+                              <a:latin typeface="Cambria Math" panose="02040503050406030204" pitchFamily="18" charset="0"/>
+                            </a:rPr>
+                            <m:t>𝑡</m:t>
+                          </m:r>
+                        </m:e>
+                      </m:d>
+                      <m:r>
+                        <a:rPr lang="en-US" altLang="zh-CN" b="0" i="1" smtClean="0">
+                          <a:latin typeface="Cambria Math" panose="02040503050406030204" pitchFamily="18" charset="0"/>
+                        </a:rPr>
+                        <m:t>+</m:t>
+                      </m:r>
+                      <m:sSub>
+                        <m:sSubPr>
+                          <m:ctrlPr>
+                            <a:rPr lang="en-US" altLang="zh-CN" b="0" i="1" smtClean="0">
+                              <a:latin typeface="Cambria Math" panose="02040503050406030204" pitchFamily="18" charset="0"/>
+                            </a:rPr>
+                          </m:ctrlPr>
+                        </m:sSubPr>
+                        <m:e>
+                          <m:r>
+                            <a:rPr lang="en-US" altLang="zh-CN" b="0" i="1" smtClean="0">
+                              <a:latin typeface="Cambria Math" panose="02040503050406030204" pitchFamily="18" charset="0"/>
+                            </a:rPr>
+                            <m:t>𝐹</m:t>
+                          </m:r>
+                        </m:e>
+                        <m:sub>
+                          <m:r>
+                            <a:rPr lang="en-US" altLang="zh-CN" b="0" i="1" smtClean="0">
+                              <a:latin typeface="Cambria Math" panose="02040503050406030204" pitchFamily="18" charset="0"/>
+                            </a:rPr>
+                            <m:t>2</m:t>
+                          </m:r>
+                        </m:sub>
+                      </m:sSub>
+                      <m:d>
+                        <m:dPr>
+                          <m:ctrlPr>
+                            <a:rPr lang="en-US" altLang="zh-CN" b="0" i="1" smtClean="0">
+                              <a:latin typeface="Cambria Math" panose="02040503050406030204" pitchFamily="18" charset="0"/>
+                            </a:rPr>
+                          </m:ctrlPr>
+                        </m:dPr>
+                        <m:e>
+                          <m:r>
+                            <a:rPr lang="en-US" altLang="zh-CN" b="0" i="1" smtClean="0">
+                              <a:latin typeface="Cambria Math" panose="02040503050406030204" pitchFamily="18" charset="0"/>
+                            </a:rPr>
+                            <m:t>𝑥</m:t>
+                          </m:r>
+                          <m:r>
+                            <a:rPr lang="en-US" altLang="zh-CN" b="0" i="1" smtClean="0">
+                              <a:latin typeface="Cambria Math" panose="02040503050406030204" pitchFamily="18" charset="0"/>
+                            </a:rPr>
+                            <m:t>,</m:t>
+                          </m:r>
+                          <m:r>
+                            <a:rPr lang="en-US" altLang="zh-CN" b="0" i="1" smtClean="0">
+                              <a:latin typeface="Cambria Math" panose="02040503050406030204" pitchFamily="18" charset="0"/>
+                            </a:rPr>
+                            <m:t>𝑦</m:t>
+                          </m:r>
+                        </m:e>
+                      </m:d>
+                      <m:r>
+                        <a:rPr lang="en-US" altLang="zh-CN" b="0" i="1" smtClean="0">
+                          <a:latin typeface="Cambria Math" panose="02040503050406030204" pitchFamily="18" charset="0"/>
+                          <a:ea typeface="Cambria Math" panose="02040503050406030204" pitchFamily="18" charset="0"/>
+                        </a:rPr>
+                        <m:t>×</m:t>
+                      </m:r>
+                      <m:sSub>
+                        <m:sSubPr>
+                          <m:ctrlPr>
+                            <a:rPr lang="en-US" altLang="zh-CN" b="0" i="1" smtClean="0">
+                              <a:latin typeface="Cambria Math" panose="02040503050406030204" pitchFamily="18" charset="0"/>
+                              <a:ea typeface="Cambria Math" panose="02040503050406030204" pitchFamily="18" charset="0"/>
+                            </a:rPr>
+                          </m:ctrlPr>
+                        </m:sSubPr>
+                        <m:e>
+                          <m:r>
+                            <a:rPr lang="en-US" altLang="zh-CN" b="0" i="1" smtClean="0">
+                              <a:latin typeface="Cambria Math" panose="02040503050406030204" pitchFamily="18" charset="0"/>
+                              <a:ea typeface="Cambria Math" panose="02040503050406030204" pitchFamily="18" charset="0"/>
+                            </a:rPr>
+                            <m:t>𝐺</m:t>
+                          </m:r>
+                        </m:e>
+                        <m:sub>
+                          <m:r>
+                            <a:rPr lang="en-US" altLang="zh-CN" b="0" i="1" smtClean="0">
+                              <a:latin typeface="Cambria Math" panose="02040503050406030204" pitchFamily="18" charset="0"/>
+                              <a:ea typeface="Cambria Math" panose="02040503050406030204" pitchFamily="18" charset="0"/>
+                            </a:rPr>
+                            <m:t>2</m:t>
+                          </m:r>
+                        </m:sub>
+                      </m:sSub>
+                      <m:d>
+                        <m:dPr>
+                          <m:ctrlPr>
+                            <a:rPr lang="en-US" altLang="zh-CN" b="0" i="1" smtClean="0">
+                              <a:latin typeface="Cambria Math" panose="02040503050406030204" pitchFamily="18" charset="0"/>
+                              <a:ea typeface="Cambria Math" panose="02040503050406030204" pitchFamily="18" charset="0"/>
+                            </a:rPr>
+                          </m:ctrlPr>
+                        </m:dPr>
+                        <m:e>
+                          <m:r>
+                            <a:rPr lang="en-US" altLang="zh-CN" b="0" i="1" smtClean="0">
+                              <a:latin typeface="Cambria Math" panose="02040503050406030204" pitchFamily="18" charset="0"/>
+                              <a:ea typeface="Cambria Math" panose="02040503050406030204" pitchFamily="18" charset="0"/>
+                            </a:rPr>
+                            <m:t>𝑡</m:t>
+                          </m:r>
+                        </m:e>
+                      </m:d>
+                      <m:r>
+                        <a:rPr lang="en-US" altLang="zh-CN" b="0" i="1" smtClean="0">
+                          <a:latin typeface="Cambria Math" panose="02040503050406030204" pitchFamily="18" charset="0"/>
+                          <a:ea typeface="Cambria Math" panose="02040503050406030204" pitchFamily="18" charset="0"/>
+                        </a:rPr>
+                        <m:t>+</m:t>
+                      </m:r>
+                      <m:r>
+                        <a:rPr lang="en-US" altLang="zh-CN" i="1">
+                          <a:latin typeface="Cambria Math" panose="02040503050406030204" pitchFamily="18" charset="0"/>
+                          <a:ea typeface="Cambria Math" panose="02040503050406030204" pitchFamily="18" charset="0"/>
+                        </a:rPr>
+                        <m:t>…</m:t>
+                      </m:r>
+                    </m:oMath>
+                  </m:oMathPara>
+                </a14:m>
+                <a:endParaRPr lang="en-US" altLang="zh-CN" dirty="0"/>
+              </a:p>
+              <a:p>
+                <a:pPr marL="0" indent="0">
+                  <a:buNone/>
+                </a:pPr>
+                <a:r>
+                  <a:rPr lang="zh-CN" altLang="en-US" dirty="0"/>
+                  <a:t>将预测的皮尔森系数画在世界</a:t>
+                </a:r>
+                <a:r>
+                  <a:rPr lang="zh-CN" altLang="en-US"/>
+                  <a:t>地图上</a:t>
+                </a:r>
+                <a:endParaRPr lang="en-US" altLang="zh-CN"/>
+              </a:p>
+            </p:txBody>
+          </p:sp>
+        </mc:Choice>
+        <mc:Fallback>
+          <p:sp>
+            <p:nvSpPr>
+              <p:cNvPr id="3" name="内容占位符 2">
+                <a:extLst>
+                  <a:ext uri="{FF2B5EF4-FFF2-40B4-BE49-F238E27FC236}">
+                    <a16:creationId xmlns:a16="http://schemas.microsoft.com/office/drawing/2014/main" id="{B8797070-FA31-4CD3-90F1-983F0E2F2111}"/>
+                  </a:ext>
+                </a:extLst>
+              </p:cNvPr>
+              <p:cNvSpPr>
+                <a:spLocks noGrp="1" noRot="1" noChangeAspect="1" noMove="1" noResize="1" noEditPoints="1" noAdjustHandles="1" noChangeArrowheads="1" noChangeShapeType="1" noTextEdit="1"/>
+              </p:cNvSpPr>
+              <p:nvPr>
+                <p:ph idx="1"/>
+              </p:nvPr>
+            </p:nvSpPr>
+            <p:spPr>
+              <a:blipFill>
+                <a:blip r:embed="rId2"/>
+                <a:stretch>
+                  <a:fillRect l="-1217" t="-2521"/>
+                </a:stretch>
+              </a:blipFill>
+            </p:spPr>
+            <p:txBody>
+              <a:bodyPr/>
+              <a:lstStyle/>
+              <a:p>
+                <a:r>
+                  <a:rPr lang="zh-CN" altLang="en-US">
+                    <a:noFill/>
+                  </a:rPr>
+                  <a:t> </a:t>
+                </a:r>
+              </a:p>
+            </p:txBody>
+          </p:sp>
+        </mc:Fallback>
+      </mc:AlternateContent>
+      <p:sp>
+        <p:nvSpPr>
+          <p:cNvPr id="4" name="日期占位符 3">
+            <a:extLst>
+              <a:ext uri="{FF2B5EF4-FFF2-40B4-BE49-F238E27FC236}">
+                <a16:creationId xmlns:a16="http://schemas.microsoft.com/office/drawing/2014/main" id="{26412276-C8A6-42B6-B867-3A9D29082359}"/>
+              </a:ext>
+            </a:extLst>
+          </p:cNvPr>
+          <p:cNvSpPr>
+            <a:spLocks noGrp="1"/>
+          </p:cNvSpPr>
+          <p:nvPr>
+            <p:ph type="dt" sz="half" idx="10"/>
+          </p:nvPr>
+        </p:nvSpPr>
+        <p:spPr/>
+        <p:txBody>
+          <a:bodyPr/>
+          <a:lstStyle/>
+          <a:p>
+            <a:r>
+              <a:rPr lang="en-US" altLang="zh-CN" dirty="0"/>
+              <a:t>2020/12/16</a:t>
+            </a:r>
+            <a:endParaRPr lang="zh-CN" altLang="en-US" dirty="0"/>
+          </a:p>
+        </p:txBody>
+      </p:sp>
+    </p:spTree>
+    <p:extLst>
+      <p:ext uri="{BB962C8B-B14F-4D97-AF65-F5344CB8AC3E}">
+        <p14:creationId xmlns:p14="http://schemas.microsoft.com/office/powerpoint/2010/main" val="3038972196"/>
       </p:ext>
     </p:extLst>
   </p:cSld>

</xml_diff>

<commit_message>
add 5D result world hot map.
</commit_message>
<xml_diff>
--- a/workshop_summary.pptx
+++ b/workshop_summary.pptx
@@ -5,7 +5,7 @@
     <p:sldMasterId id="2147483648" r:id="rId1"/>
   </p:sldMasterIdLst>
   <p:notesMasterIdLst>
-    <p:notesMasterId r:id="rId19"/>
+    <p:notesMasterId r:id="rId20"/>
   </p:notesMasterIdLst>
   <p:sldIdLst>
     <p:sldId id="256" r:id="rId2"/>
@@ -25,6 +25,7 @@
     <p:sldId id="270" r:id="rId16"/>
     <p:sldId id="271" r:id="rId17"/>
     <p:sldId id="272" r:id="rId18"/>
+    <p:sldId id="273" r:id="rId19"/>
   </p:sldIdLst>
   <p:sldSz cx="12192000" cy="6858000"/>
   <p:notesSz cx="6858000" cy="9144000"/>
@@ -213,7 +214,7 @@
           <a:p>
             <a:fld id="{7E45A342-5B8C-47A5-A361-1075BECA0050}" type="datetimeFigureOut">
               <a:rPr lang="zh-CN" altLang="en-US" smtClean="0"/>
-              <a:t>2020/12/16</a:t>
+              <a:t>2020/12/17</a:t>
             </a:fld>
             <a:endParaRPr lang="zh-CN" altLang="en-US"/>
           </a:p>
@@ -5674,8 +5675,8 @@
           </a:p>
         </p:txBody>
       </p:sp>
-      <mc:AlternateContent xmlns:mc="http://schemas.openxmlformats.org/markup-compatibility/2006">
-        <mc:Choice xmlns:a14="http://schemas.microsoft.com/office/drawing/2010/main" Requires="a14">
+      <mc:AlternateContent xmlns:mc="http://schemas.openxmlformats.org/markup-compatibility/2006" xmlns:a14="http://schemas.microsoft.com/office/drawing/2010/main">
+        <mc:Choice Requires="a14">
           <p:sp>
             <p:nvSpPr>
               <p:cNvPr id="3" name="内容占位符 2">
@@ -6008,18 +6009,14 @@
                 </a:pPr>
                 <a:r>
                   <a:rPr lang="zh-CN" altLang="en-US" dirty="0"/>
-                  <a:t>将预测的皮尔森系数画在世界</a:t>
+                  <a:t>将预测的皮尔森系数画在世界地图上</a:t>
                 </a:r>
-                <a:r>
-                  <a:rPr lang="zh-CN" altLang="en-US"/>
-                  <a:t>地图上</a:t>
-                </a:r>
-                <a:endParaRPr lang="en-US" altLang="zh-CN"/>
+                <a:endParaRPr lang="en-US" altLang="zh-CN" dirty="0"/>
               </a:p>
             </p:txBody>
           </p:sp>
         </mc:Choice>
-        <mc:Fallback>
+        <mc:Fallback xmlns="">
           <p:sp>
             <p:nvSpPr>
               <p:cNvPr id="3" name="内容占位符 2">
@@ -6092,6 +6089,369 @@
     <p:extLst>
       <p:ext uri="{BB962C8B-B14F-4D97-AF65-F5344CB8AC3E}">
         <p14:creationId xmlns:p14="http://schemas.microsoft.com/office/powerpoint/2010/main" val="3038972196"/>
+      </p:ext>
+    </p:extLst>
+  </p:cSld>
+  <p:clrMapOvr>
+    <a:masterClrMapping/>
+  </p:clrMapOvr>
+</p:sld>
+</file>
+
+<file path=ppt/slides/slide18.xml><?xml version="1.0" encoding="utf-8"?>
+<p:sld xmlns:a="http://schemas.openxmlformats.org/drawingml/2006/main" xmlns:r="http://schemas.openxmlformats.org/officeDocument/2006/relationships" xmlns:p="http://schemas.openxmlformats.org/presentationml/2006/main">
+  <p:cSld>
+    <p:spTree>
+      <p:nvGrpSpPr>
+        <p:cNvPr id="1" name=""/>
+        <p:cNvGrpSpPr/>
+        <p:nvPr/>
+      </p:nvGrpSpPr>
+      <p:grpSpPr>
+        <a:xfrm>
+          <a:off x="0" y="0"/>
+          <a:ext cx="0" cy="0"/>
+          <a:chOff x="0" y="0"/>
+          <a:chExt cx="0" cy="0"/>
+        </a:xfrm>
+      </p:grpSpPr>
+      <p:sp>
+        <p:nvSpPr>
+          <p:cNvPr id="2" name="标题 1">
+            <a:extLst>
+              <a:ext uri="{FF2B5EF4-FFF2-40B4-BE49-F238E27FC236}">
+                <a16:creationId xmlns:a16="http://schemas.microsoft.com/office/drawing/2014/main" id="{7F75B1BD-582D-47C7-A2E8-64B9F39659BB}"/>
+              </a:ext>
+            </a:extLst>
+          </p:cNvPr>
+          <p:cNvSpPr>
+            <a:spLocks noGrp="1"/>
+          </p:cNvSpPr>
+          <p:nvPr>
+            <p:ph type="title"/>
+          </p:nvPr>
+        </p:nvSpPr>
+        <p:spPr/>
+        <p:txBody>
+          <a:bodyPr/>
+          <a:lstStyle/>
+          <a:p>
+            <a:r>
+              <a:rPr lang="zh-CN" altLang="en-US" dirty="0"/>
+              <a:t>第九次讨论会</a:t>
+            </a:r>
+          </a:p>
+        </p:txBody>
+      </p:sp>
+      <p:sp>
+        <p:nvSpPr>
+          <p:cNvPr id="3" name="内容占位符 2">
+            <a:extLst>
+              <a:ext uri="{FF2B5EF4-FFF2-40B4-BE49-F238E27FC236}">
+                <a16:creationId xmlns:a16="http://schemas.microsoft.com/office/drawing/2014/main" id="{B1E8E109-6221-463A-A257-0B25863EA451}"/>
+              </a:ext>
+            </a:extLst>
+          </p:cNvPr>
+          <p:cNvSpPr>
+            <a:spLocks noGrp="1"/>
+          </p:cNvSpPr>
+          <p:nvPr>
+            <p:ph idx="1"/>
+          </p:nvPr>
+        </p:nvSpPr>
+        <p:spPr/>
+        <p:txBody>
+          <a:bodyPr>
+            <a:normAutofit/>
+          </a:bodyPr>
+          <a:lstStyle/>
+          <a:p>
+            <a:pPr marL="0" indent="0">
+              <a:buNone/>
+            </a:pPr>
+            <a:r>
+              <a:rPr lang="en-US" altLang="zh-CN" sz="2400" dirty="0"/>
+              <a:t>2020</a:t>
+            </a:r>
+            <a:r>
+              <a:rPr lang="zh-CN" altLang="en-US" sz="2400" dirty="0"/>
+              <a:t>年</a:t>
+            </a:r>
+            <a:r>
+              <a:rPr lang="en-US" altLang="zh-CN" sz="2400" dirty="0"/>
+              <a:t>12</a:t>
+            </a:r>
+            <a:r>
+              <a:rPr lang="zh-CN" altLang="en-US" sz="2400" dirty="0"/>
+              <a:t>月</a:t>
+            </a:r>
+            <a:r>
+              <a:rPr lang="en-US" altLang="zh-CN" sz="2400" dirty="0"/>
+              <a:t>17</a:t>
+            </a:r>
+            <a:r>
+              <a:rPr lang="zh-CN" altLang="en-US" sz="2400" dirty="0"/>
+              <a:t>日需要做的工作总结</a:t>
+            </a:r>
+            <a:endParaRPr lang="en-US" altLang="zh-CN" sz="2400" dirty="0"/>
+          </a:p>
+          <a:p>
+            <a:pPr marL="0" indent="0">
+              <a:buNone/>
+            </a:pPr>
+            <a:r>
+              <a:rPr lang="en-US" altLang="zh-CN" sz="2400" dirty="0"/>
+              <a:t>1</a:t>
+            </a:r>
+            <a:r>
+              <a:rPr lang="zh-CN" altLang="en-US" sz="2400" dirty="0"/>
+              <a:t>、画出带</a:t>
+            </a:r>
+            <a:r>
+              <a:rPr lang="en-US" altLang="zh-CN" sz="2400" dirty="0"/>
+              <a:t>bar</a:t>
+            </a:r>
+            <a:r>
+              <a:rPr lang="zh-CN" altLang="en-US" sz="2400" dirty="0"/>
+              <a:t>的世界地图上的热力图</a:t>
+            </a:r>
+            <a:r>
+              <a:rPr lang="en-US" altLang="zh-CN" sz="2400" dirty="0"/>
+              <a:t>………………</a:t>
+            </a:r>
+            <a:r>
+              <a:rPr lang="zh-CN" altLang="en-US" sz="2400" dirty="0">
+                <a:solidFill>
+                  <a:srgbClr val="FF0000"/>
+                </a:solidFill>
+              </a:rPr>
+              <a:t>第三、画出带</a:t>
+            </a:r>
+            <a:r>
+              <a:rPr lang="en-US" altLang="zh-CN" sz="2400" dirty="0">
+                <a:solidFill>
+                  <a:srgbClr val="FF0000"/>
+                </a:solidFill>
+              </a:rPr>
+              <a:t>bar</a:t>
+            </a:r>
+            <a:r>
+              <a:rPr lang="zh-CN" altLang="en-US" sz="2400" dirty="0">
+                <a:solidFill>
+                  <a:srgbClr val="FF0000"/>
+                </a:solidFill>
+              </a:rPr>
+              <a:t>的热力图</a:t>
+            </a:r>
+            <a:r>
+              <a:rPr lang="zh-CN" altLang="en-US" sz="2400" dirty="0"/>
+              <a:t>           </a:t>
+            </a:r>
+            <a:endParaRPr lang="en-US" altLang="zh-CN" sz="2400" dirty="0"/>
+          </a:p>
+          <a:p>
+            <a:pPr marL="0" indent="0">
+              <a:buNone/>
+            </a:pPr>
+            <a:r>
+              <a:rPr lang="en-US" altLang="zh-CN" sz="2400" dirty="0"/>
+              <a:t>2</a:t>
+            </a:r>
+            <a:r>
+              <a:rPr lang="zh-CN" altLang="en-US" sz="2400" dirty="0"/>
+              <a:t>、运行</a:t>
+            </a:r>
+            <a:r>
+              <a:rPr lang="en-US" altLang="zh-CN" sz="2400" dirty="0"/>
+              <a:t>20</a:t>
+            </a:r>
+            <a:r>
+              <a:rPr lang="zh-CN" altLang="en-US" sz="2400" dirty="0"/>
+              <a:t>天之后的数据</a:t>
+            </a:r>
+            <a:r>
+              <a:rPr lang="en-US" altLang="zh-CN" sz="2400" dirty="0"/>
+              <a:t>……………………………………</a:t>
+            </a:r>
+            <a:r>
+              <a:rPr lang="zh-CN" altLang="en-US" sz="2400" dirty="0"/>
+              <a:t>第一、先跑数据</a:t>
+            </a:r>
+            <a:endParaRPr lang="en-US" altLang="zh-CN" sz="2400" dirty="0"/>
+          </a:p>
+          <a:p>
+            <a:pPr marL="0" indent="0">
+              <a:buNone/>
+            </a:pPr>
+            <a:r>
+              <a:rPr lang="en-US" altLang="zh-CN" sz="2400" dirty="0"/>
+              <a:t>3</a:t>
+            </a:r>
+            <a:r>
+              <a:rPr lang="zh-CN" altLang="en-US" sz="2400" dirty="0"/>
+              <a:t>、画出之后利用</a:t>
+            </a:r>
+            <a:r>
+              <a:rPr lang="en-US" altLang="zh-CN" sz="2400" dirty="0"/>
+              <a:t>5</a:t>
+            </a:r>
+            <a:r>
+              <a:rPr lang="zh-CN" altLang="en-US" sz="2400" dirty="0"/>
+              <a:t>维</a:t>
+            </a:r>
+            <a:r>
+              <a:rPr lang="en-US" altLang="zh-CN" sz="2400" dirty="0" err="1"/>
+              <a:t>cio</a:t>
+            </a:r>
+            <a:r>
+              <a:rPr lang="zh-CN" altLang="en-US" sz="2400" dirty="0"/>
+              <a:t>数据跑的结果</a:t>
+            </a:r>
+            <a:r>
+              <a:rPr lang="en-US" altLang="zh-CN" sz="2400" dirty="0"/>
+              <a:t>………………</a:t>
+            </a:r>
+            <a:r>
+              <a:rPr lang="zh-CN" altLang="en-US" sz="2400" dirty="0"/>
+              <a:t>第二、画出五维的</a:t>
+            </a:r>
+            <a:r>
+              <a:rPr lang="en-US" altLang="zh-CN" sz="2400" dirty="0" err="1"/>
+              <a:t>cio</a:t>
+            </a:r>
+            <a:r>
+              <a:rPr lang="zh-CN" altLang="en-US" sz="2400" dirty="0"/>
+              <a:t>数据</a:t>
+            </a:r>
+            <a:endParaRPr lang="en-US" altLang="zh-CN" sz="2400" dirty="0"/>
+          </a:p>
+          <a:p>
+            <a:pPr marL="0" indent="0">
+              <a:buNone/>
+            </a:pPr>
+            <a:r>
+              <a:rPr lang="en-US" altLang="zh-CN" sz="2400" dirty="0"/>
+              <a:t>4</a:t>
+            </a:r>
+            <a:r>
+              <a:rPr lang="zh-CN" altLang="en-US" sz="2400" dirty="0"/>
+              <a:t>、整理</a:t>
+            </a:r>
+            <a:r>
+              <a:rPr lang="en-US" altLang="zh-CN" sz="2400" dirty="0"/>
+              <a:t>ppt</a:t>
+            </a:r>
+            <a:r>
+              <a:rPr lang="zh-CN" altLang="en-US" sz="2400" dirty="0"/>
+              <a:t>，做好明天的演讲</a:t>
+            </a:r>
+            <a:r>
+              <a:rPr lang="en-US" altLang="zh-CN" sz="2400" dirty="0"/>
+              <a:t>……………………………</a:t>
+            </a:r>
+            <a:r>
+              <a:rPr lang="zh-CN" altLang="en-US" sz="2400" dirty="0">
+                <a:solidFill>
+                  <a:srgbClr val="FF0000"/>
+                </a:solidFill>
+              </a:rPr>
+              <a:t>第四、预先准备下</a:t>
+            </a:r>
+            <a:r>
+              <a:rPr lang="en-US" altLang="zh-CN" sz="2400" dirty="0">
+                <a:solidFill>
+                  <a:srgbClr val="FF0000"/>
+                </a:solidFill>
+              </a:rPr>
+              <a:t>ppt</a:t>
+            </a:r>
+          </a:p>
+          <a:p>
+            <a:pPr marL="0" indent="0">
+              <a:buNone/>
+            </a:pPr>
+            <a:r>
+              <a:rPr lang="en-US" altLang="zh-CN" sz="2400" dirty="0"/>
+              <a:t>5</a:t>
+            </a:r>
+            <a:r>
+              <a:rPr lang="zh-CN" altLang="en-US" sz="2400" dirty="0"/>
+              <a:t>、之后整理好数据，井井有条，好用好找。</a:t>
+            </a:r>
+            <a:r>
+              <a:rPr lang="en-US" altLang="zh-CN" sz="2400" dirty="0"/>
+              <a:t>……</a:t>
+            </a:r>
+            <a:r>
+              <a:rPr lang="zh-CN" altLang="en-US" sz="2400" dirty="0">
+                <a:solidFill>
+                  <a:srgbClr val="FF0000"/>
+                </a:solidFill>
+              </a:rPr>
+              <a:t>之后工作，整理数据</a:t>
+            </a:r>
+            <a:endParaRPr lang="en-US" altLang="zh-CN" sz="2400" dirty="0">
+              <a:solidFill>
+                <a:srgbClr val="FF0000"/>
+              </a:solidFill>
+            </a:endParaRPr>
+          </a:p>
+          <a:p>
+            <a:pPr marL="0" indent="0">
+              <a:buNone/>
+            </a:pPr>
+            <a:r>
+              <a:rPr lang="en-US" altLang="zh-CN" sz="2400" dirty="0"/>
+              <a:t>Ps</a:t>
+            </a:r>
+            <a:r>
+              <a:rPr lang="zh-CN" altLang="en-US" sz="2400" dirty="0"/>
+              <a:t>：</a:t>
+            </a:r>
+            <a:r>
+              <a:rPr lang="zh-CN" altLang="en-US" sz="2400" dirty="0">
+                <a:solidFill>
+                  <a:srgbClr val="FF0000"/>
+                </a:solidFill>
+              </a:rPr>
+              <a:t>明天带笔记本电脑</a:t>
+            </a:r>
+          </a:p>
+        </p:txBody>
+      </p:sp>
+      <p:sp>
+        <p:nvSpPr>
+          <p:cNvPr id="4" name="日期占位符 3">
+            <a:extLst>
+              <a:ext uri="{FF2B5EF4-FFF2-40B4-BE49-F238E27FC236}">
+                <a16:creationId xmlns:a16="http://schemas.microsoft.com/office/drawing/2014/main" id="{E07C351D-C7E1-4492-803F-E1682A0DC42E}"/>
+              </a:ext>
+            </a:extLst>
+          </p:cNvPr>
+          <p:cNvSpPr>
+            <a:spLocks noGrp="1"/>
+          </p:cNvSpPr>
+          <p:nvPr>
+            <p:ph type="dt" sz="half" idx="10"/>
+          </p:nvPr>
+        </p:nvSpPr>
+        <p:spPr/>
+        <p:txBody>
+          <a:bodyPr/>
+          <a:lstStyle/>
+          <a:p>
+            <a:r>
+              <a:rPr lang="en-US" altLang="zh-CN" dirty="0"/>
+              <a:t>2020/12/17</a:t>
+            </a:r>
+            <a:endParaRPr lang="zh-CN" altLang="en-US" dirty="0"/>
+          </a:p>
+        </p:txBody>
+      </p:sp>
+    </p:spTree>
+    <p:extLst>
+      <p:ext uri="{BB962C8B-B14F-4D97-AF65-F5344CB8AC3E}">
+        <p14:creationId xmlns:p14="http://schemas.microsoft.com/office/powerpoint/2010/main" val="401917071"/>
       </p:ext>
     </p:extLst>
   </p:cSld>

</xml_diff>